<commit_message>
Added simple dependancy tree views
</commit_message>
<xml_diff>
--- a/documentation/Presentation.pptx
+++ b/documentation/Presentation.pptx
@@ -5,17 +5,18 @@
     <p:sldMasterId id="2147483648" r:id="rId1"/>
   </p:sldMasterIdLst>
   <p:notesMasterIdLst>
-    <p:notesMasterId r:id="rId7"/>
+    <p:notesMasterId r:id="rId8"/>
   </p:notesMasterIdLst>
   <p:handoutMasterIdLst>
-    <p:handoutMasterId r:id="rId8"/>
+    <p:handoutMasterId r:id="rId9"/>
   </p:handoutMasterIdLst>
   <p:sldIdLst>
     <p:sldId id="276" r:id="rId2"/>
     <p:sldId id="278" r:id="rId3"/>
-    <p:sldId id="277" r:id="rId4"/>
-    <p:sldId id="279" r:id="rId5"/>
-    <p:sldId id="261" r:id="rId6"/>
+    <p:sldId id="280" r:id="rId4"/>
+    <p:sldId id="277" r:id="rId5"/>
+    <p:sldId id="279" r:id="rId6"/>
+    <p:sldId id="261" r:id="rId7"/>
   </p:sldIdLst>
   <p:sldSz cx="9144000" cy="6858000" type="screen4x3"/>
   <p:notesSz cx="6858000" cy="9144000"/>
@@ -121,6 +122,7 @@
           <p14:sldIdLst>
             <p14:sldId id="276"/>
             <p14:sldId id="278"/>
+            <p14:sldId id="280"/>
             <p14:sldId id="277"/>
             <p14:sldId id="279"/>
             <p14:sldId id="261"/>
@@ -242,7 +244,7 @@
           <a:p>
             <a:fld id="{5103D7F7-97BD-49D0-B9CE-923848E1B6BB}" type="datetimeFigureOut">
               <a:rPr lang="en-GB" smtClean="0"/>
-              <a:t>05/03/2020</a:t>
+              <a:t>06/03/2020</a:t>
             </a:fld>
             <a:endParaRPr lang="en-GB"/>
           </a:p>
@@ -407,7 +409,7 @@
           <a:p>
             <a:fld id="{01916E7C-9FB2-4C78-B869-2DBBDE9D585A}" type="datetimeFigureOut">
               <a:rPr lang="en-GB" smtClean="0"/>
-              <a:t>05/03/2020</a:t>
+              <a:t>06/03/2020</a:t>
             </a:fld>
             <a:endParaRPr lang="en-GB"/>
           </a:p>
@@ -833,7 +835,7 @@
           <a:p>
             <a:fld id="{BAEBD7BB-E197-40C5-BACD-84078B0DCDC5}" type="slidenum">
               <a:rPr lang="en-GB" smtClean="0"/>
-              <a:t>3</a:t>
+              <a:t>4</a:t>
             </a:fld>
             <a:endParaRPr lang="en-GB"/>
           </a:p>
@@ -1153,7 +1155,7 @@
           <a:p>
             <a:fld id="{C47C3808-D0E5-4D15-A9FF-8BA6ECFFB88B}" type="datetimeFigureOut">
               <a:rPr lang="en-GB" smtClean="0"/>
-              <a:t>05/03/2020</a:t>
+              <a:t>06/03/2020</a:t>
             </a:fld>
             <a:endParaRPr lang="en-GB"/>
           </a:p>
@@ -1373,7 +1375,7 @@
           <a:p>
             <a:fld id="{C47C3808-D0E5-4D15-A9FF-8BA6ECFFB88B}" type="datetimeFigureOut">
               <a:rPr lang="en-GB" smtClean="0"/>
-              <a:t>05/03/2020</a:t>
+              <a:t>06/03/2020</a:t>
             </a:fld>
             <a:endParaRPr lang="en-GB"/>
           </a:p>
@@ -1669,7 +1671,7 @@
           <a:p>
             <a:fld id="{C47C3808-D0E5-4D15-A9FF-8BA6ECFFB88B}" type="datetimeFigureOut">
               <a:rPr lang="en-GB" smtClean="0"/>
-              <a:t>05/03/2020</a:t>
+              <a:t>06/03/2020</a:t>
             </a:fld>
             <a:endParaRPr lang="en-GB"/>
           </a:p>
@@ -1977,7 +1979,7 @@
           <a:p>
             <a:fld id="{C47C3808-D0E5-4D15-A9FF-8BA6ECFFB88B}" type="datetimeFigureOut">
               <a:rPr lang="en-GB" smtClean="0"/>
-              <a:t>05/03/2020</a:t>
+              <a:t>06/03/2020</a:t>
             </a:fld>
             <a:endParaRPr lang="en-GB"/>
           </a:p>
@@ -2119,7 +2121,7 @@
           <a:p>
             <a:fld id="{C47C3808-D0E5-4D15-A9FF-8BA6ECFFB88B}" type="datetimeFigureOut">
               <a:rPr lang="en-GB" smtClean="0"/>
-              <a:t>05/03/2020</a:t>
+              <a:t>06/03/2020</a:t>
             </a:fld>
             <a:endParaRPr lang="en-GB"/>
           </a:p>
@@ -2432,7 +2434,7 @@
           <a:p>
             <a:fld id="{C47C3808-D0E5-4D15-A9FF-8BA6ECFFB88B}" type="datetimeFigureOut">
               <a:rPr lang="en-GB" smtClean="0"/>
-              <a:t>05/03/2020</a:t>
+              <a:t>06/03/2020</a:t>
             </a:fld>
             <a:endParaRPr lang="en-GB"/>
           </a:p>
@@ -2700,7 +2702,7 @@
           <a:p>
             <a:fld id="{C47C3808-D0E5-4D15-A9FF-8BA6ECFFB88B}" type="datetimeFigureOut">
               <a:rPr lang="en-GB" smtClean="0"/>
-              <a:t>05/03/2020</a:t>
+              <a:t>06/03/2020</a:t>
             </a:fld>
             <a:endParaRPr lang="en-GB"/>
           </a:p>
@@ -2904,7 +2906,7 @@
             <a:fld id="{C47C3808-D0E5-4D15-A9FF-8BA6ECFFB88B}" type="datetimeFigureOut">
               <a:rPr lang="en-GB" smtClean="0"/>
               <a:pPr/>
-              <a:t>05/03/2020</a:t>
+              <a:t>06/03/2020</a:t>
             </a:fld>
             <a:endParaRPr lang="en-GB" dirty="0"/>
           </a:p>
@@ -3430,31 +3432,25 @@
         <p:spPr/>
         <p:txBody>
           <a:bodyPr>
-            <a:normAutofit fontScale="92500" lnSpcReduction="10000"/>
+            <a:normAutofit/>
           </a:bodyPr>
           <a:lstStyle/>
           <a:p>
             <a:r>
               <a:rPr lang="en-GB" dirty="0"/>
-              <a:t>SQL database backend storing data on modules, courses and staff</a:t>
+              <a:t>Web based system for managing undergraduate module information</a:t>
             </a:r>
           </a:p>
           <a:p>
             <a:r>
               <a:rPr lang="en-GB" dirty="0"/>
-              <a:t>Generating MDFs back from DB</a:t>
+              <a:t>Improve access to MDF information at year and course level</a:t>
             </a:r>
           </a:p>
           <a:p>
             <a:r>
               <a:rPr lang="en-GB" dirty="0"/>
-              <a:t>Django Based Web App frontend for modifying DB and viewing useful information</a:t>
-            </a:r>
-          </a:p>
-          <a:p>
-            <a:r>
-              <a:rPr lang="en-GB" dirty="0"/>
-              <a:t>Very much a prototype, should be integrated with Pegasus/Intranet/etc for real use.</a:t>
+              <a:t>Improve management of MDF information</a:t>
             </a:r>
           </a:p>
         </p:txBody>
@@ -3487,7 +3483,7 @@
           <a:p>
             <a:r>
               <a:rPr lang="en-GB" dirty="0"/>
-              <a:t>What we’ve done</a:t>
+              <a:t>Aims</a:t>
             </a:r>
           </a:p>
         </p:txBody>
@@ -3534,6 +3530,155 @@
           <a:chExt cx="0" cy="0"/>
         </a:xfrm>
       </p:grpSpPr>
+      <p:sp>
+        <p:nvSpPr>
+          <p:cNvPr id="2" name="Content Placeholder 1">
+            <a:extLst>
+              <a:ext uri="{FF2B5EF4-FFF2-40B4-BE49-F238E27FC236}">
+                <a16:creationId xmlns:a16="http://schemas.microsoft.com/office/drawing/2014/main" id="{E2B41E6D-2FBF-4C61-9FE1-8C5FD8706089}"/>
+              </a:ext>
+            </a:extLst>
+          </p:cNvPr>
+          <p:cNvSpPr>
+            <a:spLocks noGrp="1"/>
+          </p:cNvSpPr>
+          <p:nvPr>
+            <p:ph idx="1"/>
+          </p:nvPr>
+        </p:nvSpPr>
+        <p:spPr/>
+        <p:txBody>
+          <a:bodyPr>
+            <a:normAutofit fontScale="70000" lnSpcReduction="20000"/>
+          </a:bodyPr>
+          <a:lstStyle/>
+          <a:p>
+            <a:pPr lvl="0"/>
+            <a:r>
+              <a:rPr lang="en-US" dirty="0"/>
+              <a:t>Database structure based on MDF template, with additional fields/tables which might be useful </a:t>
+            </a:r>
+            <a:endParaRPr lang="en-GB" dirty="0"/>
+          </a:p>
+          <a:p>
+            <a:pPr lvl="0"/>
+            <a:r>
+              <a:rPr lang="en-US" dirty="0"/>
+              <a:t>Bulk pre-populated with existing MDF descriptors (45 UG classes).  </a:t>
+            </a:r>
+            <a:endParaRPr lang="en-GB" dirty="0"/>
+          </a:p>
+          <a:p>
+            <a:pPr lvl="0"/>
+            <a:r>
+              <a:rPr lang="en-US" dirty="0"/>
+              <a:t>Front end to allow MDF details to be updated</a:t>
+            </a:r>
+            <a:endParaRPr lang="en-GB" dirty="0"/>
+          </a:p>
+          <a:p>
+            <a:pPr lvl="0"/>
+            <a:r>
+              <a:rPr lang="en-US" dirty="0"/>
+              <a:t>Function to autogenerate MDF document as pdf/web </a:t>
+            </a:r>
+            <a:endParaRPr lang="en-GB" dirty="0"/>
+          </a:p>
+          <a:p>
+            <a:pPr lvl="1"/>
+            <a:r>
+              <a:rPr lang="en-GB" dirty="0"/>
+              <a:t>Easier to maintain and use than existing MDF</a:t>
+            </a:r>
+          </a:p>
+          <a:p>
+            <a:pPr lvl="1"/>
+            <a:r>
+              <a:rPr lang="en-US" dirty="0"/>
+              <a:t>Once the info is in the database, there is no need to duplicate</a:t>
+            </a:r>
+            <a:endParaRPr lang="en-GB" dirty="0"/>
+          </a:p>
+          <a:p>
+            <a:pPr lvl="0"/>
+            <a:r>
+              <a:rPr lang="en-US" dirty="0"/>
+              <a:t>Additional views (assessment schedule, module prerequisites, Rudimentary staff to module association)</a:t>
+            </a:r>
+            <a:endParaRPr lang="en-GB" dirty="0"/>
+          </a:p>
+        </p:txBody>
+      </p:sp>
+      <p:sp>
+        <p:nvSpPr>
+          <p:cNvPr id="3" name="Title 2">
+            <a:extLst>
+              <a:ext uri="{FF2B5EF4-FFF2-40B4-BE49-F238E27FC236}">
+                <a16:creationId xmlns:a16="http://schemas.microsoft.com/office/drawing/2014/main" id="{5650AA7E-5F45-4DA5-BBAF-2A4040D55FAC}"/>
+              </a:ext>
+            </a:extLst>
+          </p:cNvPr>
+          <p:cNvSpPr>
+            <a:spLocks noGrp="1"/>
+          </p:cNvSpPr>
+          <p:nvPr>
+            <p:ph type="ctrTitle"/>
+          </p:nvPr>
+        </p:nvSpPr>
+        <p:spPr/>
+        <p:txBody>
+          <a:bodyPr/>
+          <a:lstStyle/>
+          <a:p>
+            <a:r>
+              <a:rPr lang="en-GB" dirty="0"/>
+              <a:t>Key Functions</a:t>
+            </a:r>
+          </a:p>
+        </p:txBody>
+      </p:sp>
+    </p:spTree>
+    <p:extLst>
+      <p:ext uri="{BB962C8B-B14F-4D97-AF65-F5344CB8AC3E}">
+        <p14:creationId xmlns:p14="http://schemas.microsoft.com/office/powerpoint/2010/main" val="2888915909"/>
+      </p:ext>
+    </p:extLst>
+  </p:cSld>
+  <p:clrMapOvr>
+    <a:masterClrMapping/>
+  </p:clrMapOvr>
+  <mc:AlternateContent xmlns:mc="http://schemas.openxmlformats.org/markup-compatibility/2006" xmlns:p14="http://schemas.microsoft.com/office/powerpoint/2010/main">
+    <mc:Choice Requires="p14">
+      <p:transition spd="slow" p14:dur="1600">
+        <p14:prism isInverted="1"/>
+      </p:transition>
+    </mc:Choice>
+    <mc:Fallback xmlns="">
+      <p:transition spd="slow">
+        <p:fade/>
+      </p:transition>
+    </mc:Fallback>
+  </mc:AlternateContent>
+</p:sld>
+</file>
+
+<file path=ppt/slides/slide4.xml><?xml version="1.0" encoding="utf-8"?>
+<p:sld xmlns:a="http://schemas.openxmlformats.org/drawingml/2006/main" xmlns:r="http://schemas.openxmlformats.org/officeDocument/2006/relationships" xmlns:p="http://schemas.openxmlformats.org/presentationml/2006/main">
+  <p:cSld>
+    <p:spTree>
+      <p:nvGrpSpPr>
+        <p:cNvPr id="1" name=""/>
+        <p:cNvGrpSpPr/>
+        <p:nvPr/>
+      </p:nvGrpSpPr>
+      <p:grpSpPr>
+        <a:xfrm>
+          <a:off x="0" y="0"/>
+          <a:ext cx="0" cy="0"/>
+          <a:chOff x="0" y="0"/>
+          <a:chExt cx="0" cy="0"/>
+        </a:xfrm>
+      </p:grpSpPr>
       <p:pic>
         <p:nvPicPr>
           <p:cNvPr id="5" name="Content Placeholder 4">
@@ -3550,7 +3695,7 @@
             <p:ph idx="1"/>
           </p:nvPr>
         </p:nvPicPr>
-        <p:blipFill>
+        <p:blipFill rotWithShape="1">
           <a:blip r:embed="rId3">
             <a:extLst>
               <a:ext uri="{28A0092B-C50C-407E-A947-70E740481C1C}">
@@ -3558,14 +3703,13 @@
               </a:ext>
             </a:extLst>
           </a:blip>
-          <a:stretch>
-            <a:fillRect/>
-          </a:stretch>
+          <a:srcRect r="-2208"/>
+          <a:stretch/>
         </p:blipFill>
         <p:spPr>
           <a:xfrm>
-            <a:off x="1263891" y="1484784"/>
-            <a:ext cx="6620477" cy="5092675"/>
+            <a:off x="1045173" y="1484784"/>
+            <a:ext cx="7053653" cy="5308699"/>
           </a:xfrm>
         </p:spPr>
       </p:pic>
@@ -3597,7 +3741,7 @@
           <a:p>
             <a:r>
               <a:rPr lang="en-GB" dirty="0"/>
-              <a:t>Database Design</a:t>
+              <a:t>Database Schema</a:t>
             </a:r>
           </a:p>
         </p:txBody>
@@ -3627,7 +3771,7 @@
 </p:sld>
 </file>
 
-<file path=ppt/slides/slide4.xml><?xml version="1.0" encoding="utf-8"?>
+<file path=ppt/slides/slide5.xml><?xml version="1.0" encoding="utf-8"?>
 <p:sld xmlns:a="http://schemas.openxmlformats.org/drawingml/2006/main" xmlns:r="http://schemas.openxmlformats.org/officeDocument/2006/relationships" xmlns:p="http://schemas.openxmlformats.org/presentationml/2006/main">
   <p:cSld>
     <p:spTree>
@@ -3858,7 +4002,7 @@
 </p:sld>
 </file>
 
-<file path=ppt/slides/slide5.xml><?xml version="1.0" encoding="utf-8"?>
+<file path=ppt/slides/slide6.xml><?xml version="1.0" encoding="utf-8"?>
 <p:sld xmlns:a="http://schemas.openxmlformats.org/drawingml/2006/main" xmlns:r="http://schemas.openxmlformats.org/officeDocument/2006/relationships" xmlns:p="http://schemas.openxmlformats.org/presentationml/2006/main">
   <p:cSld>
     <p:bg>

</xml_diff>

<commit_message>
Fixed several things as I was preparing demo cases
</commit_message>
<xml_diff>
--- a/documentation/Presentation.pptx
+++ b/documentation/Presentation.pptx
@@ -5,18 +5,24 @@
     <p:sldMasterId id="2147483648" r:id="rId1"/>
   </p:sldMasterIdLst>
   <p:notesMasterIdLst>
-    <p:notesMasterId r:id="rId8"/>
+    <p:notesMasterId r:id="rId14"/>
   </p:notesMasterIdLst>
   <p:handoutMasterIdLst>
-    <p:handoutMasterId r:id="rId9"/>
+    <p:handoutMasterId r:id="rId15"/>
   </p:handoutMasterIdLst>
   <p:sldIdLst>
     <p:sldId id="276" r:id="rId2"/>
     <p:sldId id="278" r:id="rId3"/>
     <p:sldId id="280" r:id="rId4"/>
-    <p:sldId id="277" r:id="rId5"/>
-    <p:sldId id="279" r:id="rId6"/>
-    <p:sldId id="261" r:id="rId7"/>
+    <p:sldId id="279" r:id="rId5"/>
+    <p:sldId id="282" r:id="rId6"/>
+    <p:sldId id="283" r:id="rId7"/>
+    <p:sldId id="285" r:id="rId8"/>
+    <p:sldId id="277" r:id="rId9"/>
+    <p:sldId id="287" r:id="rId10"/>
+    <p:sldId id="288" r:id="rId11"/>
+    <p:sldId id="286" r:id="rId12"/>
+    <p:sldId id="261" r:id="rId13"/>
   </p:sldIdLst>
   <p:sldSz cx="9144000" cy="6858000" type="screen4x3"/>
   <p:notesSz cx="6858000" cy="9144000"/>
@@ -123,8 +129,14 @@
             <p14:sldId id="276"/>
             <p14:sldId id="278"/>
             <p14:sldId id="280"/>
+            <p14:sldId id="279"/>
+            <p14:sldId id="282"/>
+            <p14:sldId id="283"/>
+            <p14:sldId id="285"/>
             <p14:sldId id="277"/>
-            <p14:sldId id="279"/>
+            <p14:sldId id="287"/>
+            <p14:sldId id="288"/>
+            <p14:sldId id="286"/>
             <p14:sldId id="261"/>
           </p14:sldIdLst>
         </p14:section>
@@ -211,7 +223,7 @@
             </a:lvl1pPr>
           </a:lstStyle>
           <a:p>
-            <a:endParaRPr lang="en-GB"/>
+            <a:endParaRPr lang="en-GB" dirty="0"/>
           </a:p>
         </p:txBody>
       </p:sp>
@@ -244,9 +256,9 @@
           <a:p>
             <a:fld id="{5103D7F7-97BD-49D0-B9CE-923848E1B6BB}" type="datetimeFigureOut">
               <a:rPr lang="en-GB" smtClean="0"/>
-              <a:t>06/03/2020</a:t>
+              <a:t>09/03/2020</a:t>
             </a:fld>
-            <a:endParaRPr lang="en-GB"/>
+            <a:endParaRPr lang="en-GB" dirty="0"/>
           </a:p>
         </p:txBody>
       </p:sp>
@@ -277,7 +289,7 @@
             </a:lvl1pPr>
           </a:lstStyle>
           <a:p>
-            <a:endParaRPr lang="en-GB"/>
+            <a:endParaRPr lang="en-GB" dirty="0"/>
           </a:p>
         </p:txBody>
       </p:sp>
@@ -312,7 +324,7 @@
               <a:rPr lang="en-GB" smtClean="0"/>
               <a:t>‹#›</a:t>
             </a:fld>
-            <a:endParaRPr lang="en-GB"/>
+            <a:endParaRPr lang="en-GB" dirty="0"/>
           </a:p>
         </p:txBody>
       </p:sp>
@@ -376,7 +388,7 @@
             </a:lvl1pPr>
           </a:lstStyle>
           <a:p>
-            <a:endParaRPr lang="en-GB"/>
+            <a:endParaRPr lang="en-GB" dirty="0"/>
           </a:p>
         </p:txBody>
       </p:sp>
@@ -409,9 +421,9 @@
           <a:p>
             <a:fld id="{01916E7C-9FB2-4C78-B869-2DBBDE9D585A}" type="datetimeFigureOut">
               <a:rPr lang="en-GB" smtClean="0"/>
-              <a:t>06/03/2020</a:t>
+              <a:t>09/03/2020</a:t>
             </a:fld>
-            <a:endParaRPr lang="en-GB"/>
+            <a:endParaRPr lang="en-GB" dirty="0"/>
           </a:p>
         </p:txBody>
       </p:sp>
@@ -444,7 +456,7 @@
           <a:bodyPr vert="horz" lIns="91440" tIns="45720" rIns="91440" bIns="45720" rtlCol="0" anchor="ctr"/>
           <a:lstStyle/>
           <a:p>
-            <a:endParaRPr lang="en-GB"/>
+            <a:endParaRPr lang="en-GB" dirty="0"/>
           </a:p>
         </p:txBody>
       </p:sp>
@@ -535,7 +547,7 @@
             </a:lvl1pPr>
           </a:lstStyle>
           <a:p>
-            <a:endParaRPr lang="en-GB"/>
+            <a:endParaRPr lang="en-GB" dirty="0"/>
           </a:p>
         </p:txBody>
       </p:sp>
@@ -570,7 +582,7 @@
               <a:rPr lang="en-GB" smtClean="0"/>
               <a:t>‹#›</a:t>
             </a:fld>
-            <a:endParaRPr lang="en-GB"/>
+            <a:endParaRPr lang="en-GB" dirty="0"/>
           </a:p>
         </p:txBody>
       </p:sp>
@@ -744,7 +756,7 @@
               <a:rPr lang="en-GB" smtClean="0"/>
               <a:t>2</a:t>
             </a:fld>
-            <a:endParaRPr lang="en-GB"/>
+            <a:endParaRPr lang="en-GB" dirty="0"/>
           </a:p>
         </p:txBody>
       </p:sp>
@@ -835,9 +847,9 @@
           <a:p>
             <a:fld id="{BAEBD7BB-E197-40C5-BACD-84078B0DCDC5}" type="slidenum">
               <a:rPr lang="en-GB" smtClean="0"/>
-              <a:t>4</a:t>
+              <a:t>8</a:t>
             </a:fld>
-            <a:endParaRPr lang="en-GB"/>
+            <a:endParaRPr lang="en-GB" dirty="0"/>
           </a:p>
         </p:txBody>
       </p:sp>
@@ -1049,18 +1061,6 @@
   <p:clrMapOvr>
     <a:masterClrMapping/>
   </p:clrMapOvr>
-  <mc:AlternateContent xmlns:mc="http://schemas.openxmlformats.org/markup-compatibility/2006" xmlns:p14="http://schemas.microsoft.com/office/powerpoint/2010/main">
-    <mc:Choice Requires="p14">
-      <p:transition spd="slow" p14:dur="1600">
-        <p14:prism isInverted="1"/>
-      </p:transition>
-    </mc:Choice>
-    <mc:Fallback xmlns="">
-      <p:transition spd="slow">
-        <p:fade/>
-      </p:transition>
-    </mc:Fallback>
-  </mc:AlternateContent>
 </p:sldLayout>
 </file>
 
@@ -1155,9 +1155,9 @@
           <a:p>
             <a:fld id="{C47C3808-D0E5-4D15-A9FF-8BA6ECFFB88B}" type="datetimeFigureOut">
               <a:rPr lang="en-GB" smtClean="0"/>
-              <a:t>06/03/2020</a:t>
+              <a:t>09/03/2020</a:t>
             </a:fld>
-            <a:endParaRPr lang="en-GB"/>
+            <a:endParaRPr lang="en-GB" dirty="0"/>
           </a:p>
         </p:txBody>
       </p:sp>
@@ -1176,7 +1176,7 @@
           <a:bodyPr/>
           <a:lstStyle/>
           <a:p>
-            <a:endParaRPr lang="en-GB"/>
+            <a:endParaRPr lang="en-GB" dirty="0"/>
           </a:p>
         </p:txBody>
       </p:sp>
@@ -1199,7 +1199,7 @@
               <a:rPr lang="en-GB" smtClean="0"/>
               <a:t>‹#›</a:t>
             </a:fld>
-            <a:endParaRPr lang="en-GB"/>
+            <a:endParaRPr lang="en-GB" dirty="0"/>
           </a:p>
         </p:txBody>
       </p:sp>
@@ -1213,18 +1213,6 @@
   <p:clrMapOvr>
     <a:masterClrMapping/>
   </p:clrMapOvr>
-  <mc:AlternateContent xmlns:mc="http://schemas.openxmlformats.org/markup-compatibility/2006" xmlns:p14="http://schemas.microsoft.com/office/powerpoint/2010/main">
-    <mc:Choice Requires="p14">
-      <p:transition spd="slow" p14:dur="1600">
-        <p14:prism isInverted="1"/>
-      </p:transition>
-    </mc:Choice>
-    <mc:Fallback xmlns="">
-      <p:transition spd="slow">
-        <p:fade/>
-      </p:transition>
-    </mc:Fallback>
-  </mc:AlternateContent>
 </p:sldLayout>
 </file>
 
@@ -1255,18 +1243,6 @@
   <p:clrMapOvr>
     <a:masterClrMapping/>
   </p:clrMapOvr>
-  <mc:AlternateContent xmlns:mc="http://schemas.openxmlformats.org/markup-compatibility/2006" xmlns:p14="http://schemas.microsoft.com/office/powerpoint/2010/main">
-    <mc:Choice Requires="p14">
-      <p:transition spd="slow" p14:dur="1600">
-        <p14:prism isInverted="1"/>
-      </p:transition>
-    </mc:Choice>
-    <mc:Fallback xmlns="">
-      <p:transition spd="slow">
-        <p:fade/>
-      </p:transition>
-    </mc:Fallback>
-  </mc:AlternateContent>
 </p:sldLayout>
 </file>
 
@@ -1375,9 +1351,9 @@
           <a:p>
             <a:fld id="{C47C3808-D0E5-4D15-A9FF-8BA6ECFFB88B}" type="datetimeFigureOut">
               <a:rPr lang="en-GB" smtClean="0"/>
-              <a:t>06/03/2020</a:t>
+              <a:t>09/03/2020</a:t>
             </a:fld>
-            <a:endParaRPr lang="en-GB"/>
+            <a:endParaRPr lang="en-GB" dirty="0"/>
           </a:p>
         </p:txBody>
       </p:sp>
@@ -1396,7 +1372,7 @@
           <a:bodyPr/>
           <a:lstStyle/>
           <a:p>
-            <a:endParaRPr lang="en-GB"/>
+            <a:endParaRPr lang="en-GB" dirty="0"/>
           </a:p>
         </p:txBody>
       </p:sp>
@@ -1419,7 +1395,7 @@
               <a:rPr lang="en-GB" smtClean="0"/>
               <a:t>‹#›</a:t>
             </a:fld>
-            <a:endParaRPr lang="en-GB"/>
+            <a:endParaRPr lang="en-GB" dirty="0"/>
           </a:p>
         </p:txBody>
       </p:sp>
@@ -1468,18 +1444,6 @@
   <p:clrMapOvr>
     <a:masterClrMapping/>
   </p:clrMapOvr>
-  <mc:AlternateContent xmlns:mc="http://schemas.openxmlformats.org/markup-compatibility/2006" xmlns:p14="http://schemas.microsoft.com/office/powerpoint/2010/main">
-    <mc:Choice Requires="p14">
-      <p:transition spd="slow" p14:dur="1600">
-        <p14:prism isInverted="1"/>
-      </p:transition>
-    </mc:Choice>
-    <mc:Fallback xmlns="">
-      <p:transition spd="slow">
-        <p:fade/>
-      </p:transition>
-    </mc:Fallback>
-  </mc:AlternateContent>
 </p:sldLayout>
 </file>
 
@@ -1671,9 +1635,9 @@
           <a:p>
             <a:fld id="{C47C3808-D0E5-4D15-A9FF-8BA6ECFFB88B}" type="datetimeFigureOut">
               <a:rPr lang="en-GB" smtClean="0"/>
-              <a:t>06/03/2020</a:t>
+              <a:t>09/03/2020</a:t>
             </a:fld>
-            <a:endParaRPr lang="en-GB"/>
+            <a:endParaRPr lang="en-GB" dirty="0"/>
           </a:p>
         </p:txBody>
       </p:sp>
@@ -1692,7 +1656,7 @@
           <a:bodyPr/>
           <a:lstStyle/>
           <a:p>
-            <a:endParaRPr lang="en-GB"/>
+            <a:endParaRPr lang="en-GB" dirty="0"/>
           </a:p>
         </p:txBody>
       </p:sp>
@@ -1715,7 +1679,7 @@
               <a:rPr lang="en-GB" smtClean="0"/>
               <a:t>‹#›</a:t>
             </a:fld>
-            <a:endParaRPr lang="en-GB"/>
+            <a:endParaRPr lang="en-GB" dirty="0"/>
           </a:p>
         </p:txBody>
       </p:sp>
@@ -1729,18 +1693,6 @@
   <p:clrMapOvr>
     <a:masterClrMapping/>
   </p:clrMapOvr>
-  <mc:AlternateContent xmlns:mc="http://schemas.openxmlformats.org/markup-compatibility/2006" xmlns:p14="http://schemas.microsoft.com/office/powerpoint/2010/main">
-    <mc:Choice Requires="p14">
-      <p:transition spd="slow" p14:dur="1600">
-        <p14:prism isInverted="1"/>
-      </p:transition>
-    </mc:Choice>
-    <mc:Fallback xmlns="">
-      <p:transition spd="slow">
-        <p:fade/>
-      </p:transition>
-    </mc:Fallback>
-  </mc:AlternateContent>
 </p:sldLayout>
 </file>
 
@@ -1979,9 +1931,9 @@
           <a:p>
             <a:fld id="{C47C3808-D0E5-4D15-A9FF-8BA6ECFFB88B}" type="datetimeFigureOut">
               <a:rPr lang="en-GB" smtClean="0"/>
-              <a:t>06/03/2020</a:t>
+              <a:t>09/03/2020</a:t>
             </a:fld>
-            <a:endParaRPr lang="en-GB"/>
+            <a:endParaRPr lang="en-GB" dirty="0"/>
           </a:p>
         </p:txBody>
       </p:sp>
@@ -2000,7 +1952,7 @@
           <a:bodyPr/>
           <a:lstStyle/>
           <a:p>
-            <a:endParaRPr lang="en-GB"/>
+            <a:endParaRPr lang="en-GB" dirty="0"/>
           </a:p>
         </p:txBody>
       </p:sp>
@@ -2023,7 +1975,7 @@
               <a:rPr lang="en-GB" smtClean="0"/>
               <a:t>‹#›</a:t>
             </a:fld>
-            <a:endParaRPr lang="en-GB"/>
+            <a:endParaRPr lang="en-GB" dirty="0"/>
           </a:p>
         </p:txBody>
       </p:sp>
@@ -2037,18 +1989,6 @@
   <p:clrMapOvr>
     <a:masterClrMapping/>
   </p:clrMapOvr>
-  <mc:AlternateContent xmlns:mc="http://schemas.openxmlformats.org/markup-compatibility/2006" xmlns:p14="http://schemas.microsoft.com/office/powerpoint/2010/main">
-    <mc:Choice Requires="p14">
-      <p:transition spd="slow" p14:dur="1600">
-        <p14:prism isInverted="1"/>
-      </p:transition>
-    </mc:Choice>
-    <mc:Fallback xmlns="">
-      <p:transition spd="slow">
-        <p:fade/>
-      </p:transition>
-    </mc:Fallback>
-  </mc:AlternateContent>
 </p:sldLayout>
 </file>
 
@@ -2121,9 +2061,9 @@
           <a:p>
             <a:fld id="{C47C3808-D0E5-4D15-A9FF-8BA6ECFFB88B}" type="datetimeFigureOut">
               <a:rPr lang="en-GB" smtClean="0"/>
-              <a:t>06/03/2020</a:t>
+              <a:t>09/03/2020</a:t>
             </a:fld>
-            <a:endParaRPr lang="en-GB"/>
+            <a:endParaRPr lang="en-GB" dirty="0"/>
           </a:p>
         </p:txBody>
       </p:sp>
@@ -2142,7 +2082,7 @@
           <a:bodyPr/>
           <a:lstStyle/>
           <a:p>
-            <a:endParaRPr lang="en-GB"/>
+            <a:endParaRPr lang="en-GB" dirty="0"/>
           </a:p>
         </p:txBody>
       </p:sp>
@@ -2165,7 +2105,7 @@
               <a:rPr lang="en-GB" smtClean="0"/>
               <a:t>‹#›</a:t>
             </a:fld>
-            <a:endParaRPr lang="en-GB"/>
+            <a:endParaRPr lang="en-GB" dirty="0"/>
           </a:p>
         </p:txBody>
       </p:sp>
@@ -2179,18 +2119,6 @@
   <p:clrMapOvr>
     <a:masterClrMapping/>
   </p:clrMapOvr>
-  <mc:AlternateContent xmlns:mc="http://schemas.openxmlformats.org/markup-compatibility/2006" xmlns:p14="http://schemas.microsoft.com/office/powerpoint/2010/main">
-    <mc:Choice Requires="p14">
-      <p:transition spd="slow" p14:dur="1600">
-        <p14:prism isInverted="1"/>
-      </p:transition>
-    </mc:Choice>
-    <mc:Fallback xmlns="">
-      <p:transition spd="slow">
-        <p:fade/>
-      </p:transition>
-    </mc:Fallback>
-  </mc:AlternateContent>
 </p:sldLayout>
 </file>
 
@@ -2235,18 +2163,6 @@
   <p:clrMapOvr>
     <a:masterClrMapping/>
   </p:clrMapOvr>
-  <mc:AlternateContent xmlns:mc="http://schemas.openxmlformats.org/markup-compatibility/2006" xmlns:p14="http://schemas.microsoft.com/office/powerpoint/2010/main">
-    <mc:Choice Requires="p14">
-      <p:transition spd="slow" p14:dur="1600">
-        <p14:prism isInverted="1"/>
-      </p:transition>
-    </mc:Choice>
-    <mc:Fallback xmlns="">
-      <p:transition spd="slow">
-        <p:fade/>
-      </p:transition>
-    </mc:Fallback>
-  </mc:AlternateContent>
 </p:sldLayout>
 </file>
 
@@ -2434,9 +2350,9 @@
           <a:p>
             <a:fld id="{C47C3808-D0E5-4D15-A9FF-8BA6ECFFB88B}" type="datetimeFigureOut">
               <a:rPr lang="en-GB" smtClean="0"/>
-              <a:t>06/03/2020</a:t>
+              <a:t>09/03/2020</a:t>
             </a:fld>
-            <a:endParaRPr lang="en-GB"/>
+            <a:endParaRPr lang="en-GB" dirty="0"/>
           </a:p>
         </p:txBody>
       </p:sp>
@@ -2455,7 +2371,7 @@
           <a:bodyPr/>
           <a:lstStyle/>
           <a:p>
-            <a:endParaRPr lang="en-GB"/>
+            <a:endParaRPr lang="en-GB" dirty="0"/>
           </a:p>
         </p:txBody>
       </p:sp>
@@ -2478,7 +2394,7 @@
               <a:rPr lang="en-GB" smtClean="0"/>
               <a:t>‹#›</a:t>
             </a:fld>
-            <a:endParaRPr lang="en-GB"/>
+            <a:endParaRPr lang="en-GB" dirty="0"/>
           </a:p>
         </p:txBody>
       </p:sp>
@@ -2492,18 +2408,6 @@
   <p:clrMapOvr>
     <a:masterClrMapping/>
   </p:clrMapOvr>
-  <mc:AlternateContent xmlns:mc="http://schemas.openxmlformats.org/markup-compatibility/2006" xmlns:p14="http://schemas.microsoft.com/office/powerpoint/2010/main">
-    <mc:Choice Requires="p14">
-      <p:transition spd="slow" p14:dur="1600">
-        <p14:prism isInverted="1"/>
-      </p:transition>
-    </mc:Choice>
-    <mc:Fallback xmlns="">
-      <p:transition spd="slow">
-        <p:fade/>
-      </p:transition>
-    </mc:Fallback>
-  </mc:AlternateContent>
 </p:sldLayout>
 </file>
 
@@ -2616,7 +2520,7 @@
             </a:lvl9pPr>
           </a:lstStyle>
           <a:p>
-            <a:endParaRPr lang="en-GB"/>
+            <a:endParaRPr lang="en-GB" dirty="0"/>
           </a:p>
         </p:txBody>
       </p:sp>
@@ -2702,9 +2606,9 @@
           <a:p>
             <a:fld id="{C47C3808-D0E5-4D15-A9FF-8BA6ECFFB88B}" type="datetimeFigureOut">
               <a:rPr lang="en-GB" smtClean="0"/>
-              <a:t>06/03/2020</a:t>
+              <a:t>09/03/2020</a:t>
             </a:fld>
-            <a:endParaRPr lang="en-GB"/>
+            <a:endParaRPr lang="en-GB" dirty="0"/>
           </a:p>
         </p:txBody>
       </p:sp>
@@ -2723,7 +2627,7 @@
           <a:bodyPr/>
           <a:lstStyle/>
           <a:p>
-            <a:endParaRPr lang="en-GB"/>
+            <a:endParaRPr lang="en-GB" dirty="0"/>
           </a:p>
         </p:txBody>
       </p:sp>
@@ -2746,7 +2650,7 @@
               <a:rPr lang="en-GB" smtClean="0"/>
               <a:t>‹#›</a:t>
             </a:fld>
-            <a:endParaRPr lang="en-GB"/>
+            <a:endParaRPr lang="en-GB" dirty="0"/>
           </a:p>
         </p:txBody>
       </p:sp>
@@ -2760,18 +2664,6 @@
   <p:clrMapOvr>
     <a:masterClrMapping/>
   </p:clrMapOvr>
-  <mc:AlternateContent xmlns:mc="http://schemas.openxmlformats.org/markup-compatibility/2006" xmlns:p14="http://schemas.microsoft.com/office/powerpoint/2010/main">
-    <mc:Choice Requires="p14">
-      <p:transition spd="slow" p14:dur="1600">
-        <p14:prism isInverted="1"/>
-      </p:transition>
-    </mc:Choice>
-    <mc:Fallback xmlns="">
-      <p:transition spd="slow">
-        <p:fade/>
-      </p:transition>
-    </mc:Fallback>
-  </mc:AlternateContent>
 </p:sldLayout>
 </file>
 
@@ -2906,7 +2798,7 @@
             <a:fld id="{C47C3808-D0E5-4D15-A9FF-8BA6ECFFB88B}" type="datetimeFigureOut">
               <a:rPr lang="en-GB" smtClean="0"/>
               <a:pPr/>
-              <a:t>06/03/2020</a:t>
+              <a:t>09/03/2020</a:t>
             </a:fld>
             <a:endParaRPr lang="en-GB" dirty="0"/>
           </a:p>
@@ -3015,18 +2907,6 @@
     <p:sldLayoutId id="2147483657" r:id="rId9"/>
     <p:sldLayoutId id="2147483658" r:id="rId10"/>
   </p:sldLayoutIdLst>
-  <mc:AlternateContent xmlns:mc="http://schemas.openxmlformats.org/markup-compatibility/2006" xmlns:p14="http://schemas.microsoft.com/office/powerpoint/2010/main">
-    <mc:Choice Requires="p14">
-      <p:transition spd="slow" p14:dur="1600">
-        <p14:prism isInverted="1"/>
-      </p:transition>
-    </mc:Choice>
-    <mc:Fallback xmlns="">
-      <p:transition spd="slow">
-        <p:fade/>
-      </p:transition>
-    </mc:Fallback>
-  </mc:AlternateContent>
   <p:txStyles>
     <p:titleStyle>
       <a:lvl1pPr algn="l" defTabSz="914400" rtl="0" eaLnBrk="1" latinLnBrk="0" hangingPunct="1">
@@ -3316,7 +3196,7 @@
         <p:spPr>
           <a:xfrm>
             <a:off x="395536" y="1886967"/>
-            <a:ext cx="8062664" cy="1470025"/>
+            <a:ext cx="8062664" cy="1902073"/>
           </a:xfrm>
         </p:spPr>
         <p:txBody>
@@ -3358,15 +3238,7 @@
           <a:p>
             <a:r>
               <a:rPr lang="en-GB" dirty="0"/>
-              <a:t>Andrew Fagan &amp; </a:t>
-            </a:r>
-            <a:r>
-              <a:rPr lang="en-GB" dirty="0" err="1"/>
-              <a:t>Dr.</a:t>
-            </a:r>
-            <a:r>
-              <a:rPr lang="en-GB" dirty="0"/>
-              <a:t> Graeme West</a:t>
+              <a:t>Andrew Fagan &amp; Dr. Graeme West</a:t>
             </a:r>
           </a:p>
         </p:txBody>
@@ -3383,16 +3255,982 @@
   </p:clrMapOvr>
   <mc:AlternateContent xmlns:mc="http://schemas.openxmlformats.org/markup-compatibility/2006" xmlns:p14="http://schemas.microsoft.com/office/powerpoint/2010/main">
     <mc:Choice Requires="p14">
-      <p:transition spd="slow" p14:dur="1600">
-        <p14:prism isInverted="1"/>
-      </p:transition>
+      <p:transition p14:dur="10"/>
     </mc:Choice>
     <mc:Fallback xmlns="">
-      <p:transition spd="slow">
-        <p:fade/>
-      </p:transition>
+      <p:transition/>
     </mc:Fallback>
   </mc:AlternateContent>
+</p:sld>
+</file>
+
+<file path=ppt/slides/slide10.xml><?xml version="1.0" encoding="utf-8"?>
+<p:sld xmlns:a="http://schemas.openxmlformats.org/drawingml/2006/main" xmlns:r="http://schemas.openxmlformats.org/officeDocument/2006/relationships" xmlns:p="http://schemas.openxmlformats.org/presentationml/2006/main">
+  <p:cSld>
+    <p:spTree>
+      <p:nvGrpSpPr>
+        <p:cNvPr id="1" name=""/>
+        <p:cNvGrpSpPr/>
+        <p:nvPr/>
+      </p:nvGrpSpPr>
+      <p:grpSpPr>
+        <a:xfrm>
+          <a:off x="0" y="0"/>
+          <a:ext cx="0" cy="0"/>
+          <a:chOff x="0" y="0"/>
+          <a:chExt cx="0" cy="0"/>
+        </a:xfrm>
+      </p:grpSpPr>
+      <p:sp>
+        <p:nvSpPr>
+          <p:cNvPr id="3" name="TextBox 2">
+            <a:extLst>
+              <a:ext uri="{FF2B5EF4-FFF2-40B4-BE49-F238E27FC236}">
+                <a16:creationId xmlns:a16="http://schemas.microsoft.com/office/drawing/2014/main" id="{321B7D68-89BC-44E2-90E3-338D9ED55DC5}"/>
+              </a:ext>
+            </a:extLst>
+          </p:cNvPr>
+          <p:cNvSpPr txBox="1"/>
+          <p:nvPr/>
+        </p:nvSpPr>
+        <p:spPr>
+          <a:xfrm>
+            <a:off x="611560" y="404664"/>
+            <a:ext cx="237566" cy="369332"/>
+          </a:xfrm>
+          <a:prstGeom prst="rect">
+            <a:avLst/>
+          </a:prstGeom>
+          <a:noFill/>
+        </p:spPr>
+        <p:txBody>
+          <a:bodyPr wrap="none" rtlCol="0">
+            <a:spAutoFit/>
+          </a:bodyPr>
+          <a:lstStyle/>
+          <a:p>
+            <a:r>
+              <a:rPr lang="en-GB" dirty="0"/>
+              <a:t> </a:t>
+            </a:r>
+          </a:p>
+        </p:txBody>
+      </p:sp>
+      <p:sp>
+        <p:nvSpPr>
+          <p:cNvPr id="4" name="Title 2">
+            <a:extLst>
+              <a:ext uri="{FF2B5EF4-FFF2-40B4-BE49-F238E27FC236}">
+                <a16:creationId xmlns:a16="http://schemas.microsoft.com/office/drawing/2014/main" id="{7E1C909B-4F36-4DBD-B41C-8A88A6C378AC}"/>
+              </a:ext>
+            </a:extLst>
+          </p:cNvPr>
+          <p:cNvSpPr txBox="1">
+            <a:spLocks/>
+          </p:cNvSpPr>
+          <p:nvPr/>
+        </p:nvSpPr>
+        <p:spPr>
+          <a:xfrm>
+            <a:off x="467544" y="215886"/>
+            <a:ext cx="8208912" cy="720080"/>
+          </a:xfrm>
+          <a:prstGeom prst="rect">
+            <a:avLst/>
+          </a:prstGeom>
+        </p:spPr>
+        <p:txBody>
+          <a:bodyPr/>
+          <a:lstStyle>
+            <a:lvl1pPr algn="l" defTabSz="914400" rtl="0" eaLnBrk="1" latinLnBrk="0" hangingPunct="1">
+              <a:spcBef>
+                <a:spcPct val="0"/>
+              </a:spcBef>
+              <a:buNone/>
+              <a:defRPr sz="4000" kern="1200">
+                <a:solidFill>
+                  <a:schemeClr val="tx1"/>
+                </a:solidFill>
+                <a:latin typeface="Arial" pitchFamily="34" charset="0"/>
+                <a:ea typeface="+mj-ea"/>
+                <a:cs typeface="Arial" pitchFamily="34" charset="0"/>
+              </a:defRPr>
+            </a:lvl1pPr>
+          </a:lstStyle>
+          <a:p>
+            <a:r>
+              <a:rPr lang="en-GB" dirty="0"/>
+              <a:t>Sample MDF – Old Vs New</a:t>
+            </a:r>
+          </a:p>
+        </p:txBody>
+      </p:sp>
+      <p:sp>
+        <p:nvSpPr>
+          <p:cNvPr id="9" name="TextBox 8">
+            <a:extLst>
+              <a:ext uri="{FF2B5EF4-FFF2-40B4-BE49-F238E27FC236}">
+                <a16:creationId xmlns:a16="http://schemas.microsoft.com/office/drawing/2014/main" id="{B765869E-0813-409F-A65B-768D1F706867}"/>
+              </a:ext>
+            </a:extLst>
+          </p:cNvPr>
+          <p:cNvSpPr txBox="1"/>
+          <p:nvPr/>
+        </p:nvSpPr>
+        <p:spPr>
+          <a:xfrm>
+            <a:off x="395536" y="1486525"/>
+            <a:ext cx="7641964" cy="646331"/>
+          </a:xfrm>
+          <a:prstGeom prst="rect">
+            <a:avLst/>
+          </a:prstGeom>
+          <a:noFill/>
+        </p:spPr>
+        <p:txBody>
+          <a:bodyPr wrap="none" rtlCol="0">
+            <a:spAutoFit/>
+          </a:bodyPr>
+          <a:lstStyle/>
+          <a:p>
+            <a:r>
+              <a:rPr lang="en-GB" dirty="0"/>
+              <a:t>We can easily pull all the same data back out, and it can look however we want.</a:t>
+            </a:r>
+          </a:p>
+          <a:p>
+            <a:r>
+              <a:rPr lang="en-GB" dirty="0"/>
+              <a:t>Colour and other aesthetics are easy to change.</a:t>
+            </a:r>
+          </a:p>
+        </p:txBody>
+      </p:sp>
+      <p:pic>
+        <p:nvPicPr>
+          <p:cNvPr id="7" name="Content Placeholder 4">
+            <a:extLst>
+              <a:ext uri="{FF2B5EF4-FFF2-40B4-BE49-F238E27FC236}">
+                <a16:creationId xmlns:a16="http://schemas.microsoft.com/office/drawing/2014/main" id="{7BCBD38B-FCD0-4793-B019-C4BF6678CF9A}"/>
+              </a:ext>
+            </a:extLst>
+          </p:cNvPr>
+          <p:cNvPicPr>
+            <a:picLocks noChangeAspect="1"/>
+          </p:cNvPicPr>
+          <p:nvPr/>
+        </p:nvPicPr>
+        <p:blipFill rotWithShape="1">
+          <a:blip r:embed="rId2">
+            <a:extLst>
+              <a:ext uri="{28A0092B-C50C-407E-A947-70E740481C1C}">
+                <a14:useLocalDpi xmlns:a14="http://schemas.microsoft.com/office/drawing/2010/main" val="0"/>
+              </a:ext>
+            </a:extLst>
+          </a:blip>
+          <a:srcRect r="-2208"/>
+          <a:stretch/>
+        </p:blipFill>
+        <p:spPr>
+          <a:xfrm>
+            <a:off x="-20303" y="3401755"/>
+            <a:ext cx="4592303" cy="3456246"/>
+          </a:xfrm>
+          <a:prstGeom prst="rect">
+            <a:avLst/>
+          </a:prstGeom>
+        </p:spPr>
+      </p:pic>
+      <p:sp>
+        <p:nvSpPr>
+          <p:cNvPr id="5" name="Oval 4">
+            <a:extLst>
+              <a:ext uri="{FF2B5EF4-FFF2-40B4-BE49-F238E27FC236}">
+                <a16:creationId xmlns:a16="http://schemas.microsoft.com/office/drawing/2014/main" id="{127057E6-9CB4-427F-84A5-6CA247FE3979}"/>
+              </a:ext>
+            </a:extLst>
+          </p:cNvPr>
+          <p:cNvSpPr/>
+          <p:nvPr/>
+        </p:nvSpPr>
+        <p:spPr>
+          <a:xfrm>
+            <a:off x="1115616" y="3429000"/>
+            <a:ext cx="1152128" cy="2736304"/>
+          </a:xfrm>
+          <a:prstGeom prst="ellipse">
+            <a:avLst/>
+          </a:prstGeom>
+          <a:noFill/>
+        </p:spPr>
+        <p:style>
+          <a:lnRef idx="2">
+            <a:schemeClr val="accent1"/>
+          </a:lnRef>
+          <a:fillRef idx="1">
+            <a:schemeClr val="lt1"/>
+          </a:fillRef>
+          <a:effectRef idx="0">
+            <a:schemeClr val="accent1"/>
+          </a:effectRef>
+          <a:fontRef idx="minor">
+            <a:schemeClr val="dk1"/>
+          </a:fontRef>
+        </p:style>
+        <p:txBody>
+          <a:bodyPr rtlCol="0" anchor="ctr"/>
+          <a:lstStyle/>
+          <a:p>
+            <a:pPr algn="ctr"/>
+            <a:endParaRPr lang="en-GB"/>
+          </a:p>
+        </p:txBody>
+      </p:sp>
+      <p:pic>
+        <p:nvPicPr>
+          <p:cNvPr id="23" name="Picture 22">
+            <a:extLst>
+              <a:ext uri="{FF2B5EF4-FFF2-40B4-BE49-F238E27FC236}">
+                <a16:creationId xmlns:a16="http://schemas.microsoft.com/office/drawing/2014/main" id="{E05487DF-D5BB-4012-9EBB-C6593CF28F63}"/>
+              </a:ext>
+            </a:extLst>
+          </p:cNvPr>
+          <p:cNvPicPr>
+            <a:picLocks noChangeAspect="1"/>
+          </p:cNvPicPr>
+          <p:nvPr/>
+        </p:nvPicPr>
+        <p:blipFill rotWithShape="1">
+          <a:blip r:embed="rId3">
+            <a:extLst>
+              <a:ext uri="{28A0092B-C50C-407E-A947-70E740481C1C}">
+                <a14:useLocalDpi xmlns:a14="http://schemas.microsoft.com/office/drawing/2010/main" val="0"/>
+              </a:ext>
+            </a:extLst>
+          </a:blip>
+          <a:srcRect l="3678" r="6887"/>
+          <a:stretch/>
+        </p:blipFill>
+        <p:spPr>
+          <a:xfrm>
+            <a:off x="4545092" y="2592110"/>
+            <a:ext cx="4598907" cy="4293275"/>
+          </a:xfrm>
+          <a:prstGeom prst="rect">
+            <a:avLst/>
+          </a:prstGeom>
+        </p:spPr>
+      </p:pic>
+      <p:sp>
+        <p:nvSpPr>
+          <p:cNvPr id="24" name="Rectangle 23">
+            <a:extLst>
+              <a:ext uri="{FF2B5EF4-FFF2-40B4-BE49-F238E27FC236}">
+                <a16:creationId xmlns:a16="http://schemas.microsoft.com/office/drawing/2014/main" id="{8ACED172-364B-46F6-A33E-71C0604EC7FE}"/>
+              </a:ext>
+            </a:extLst>
+          </p:cNvPr>
+          <p:cNvSpPr/>
+          <p:nvPr/>
+        </p:nvSpPr>
+        <p:spPr>
+          <a:xfrm>
+            <a:off x="4932040" y="3140968"/>
+            <a:ext cx="3888432" cy="576064"/>
+          </a:xfrm>
+          <a:prstGeom prst="rect">
+            <a:avLst/>
+          </a:prstGeom>
+          <a:noFill/>
+        </p:spPr>
+        <p:style>
+          <a:lnRef idx="2">
+            <a:schemeClr val="accent1">
+              <a:shade val="50000"/>
+            </a:schemeClr>
+          </a:lnRef>
+          <a:fillRef idx="1">
+            <a:schemeClr val="accent1"/>
+          </a:fillRef>
+          <a:effectRef idx="0">
+            <a:schemeClr val="accent1"/>
+          </a:effectRef>
+          <a:fontRef idx="minor">
+            <a:schemeClr val="lt1"/>
+          </a:fontRef>
+        </p:style>
+        <p:txBody>
+          <a:bodyPr rtlCol="0" anchor="ctr"/>
+          <a:lstStyle/>
+          <a:p>
+            <a:pPr algn="ctr"/>
+            <a:endParaRPr lang="en-GB"/>
+          </a:p>
+        </p:txBody>
+      </p:sp>
+      <p:sp>
+        <p:nvSpPr>
+          <p:cNvPr id="25" name="Oval 24">
+            <a:extLst>
+              <a:ext uri="{FF2B5EF4-FFF2-40B4-BE49-F238E27FC236}">
+                <a16:creationId xmlns:a16="http://schemas.microsoft.com/office/drawing/2014/main" id="{A36BFEA3-4840-4724-851B-E751DD9AE881}"/>
+              </a:ext>
+            </a:extLst>
+          </p:cNvPr>
+          <p:cNvSpPr/>
+          <p:nvPr/>
+        </p:nvSpPr>
+        <p:spPr>
+          <a:xfrm>
+            <a:off x="3553189" y="4509120"/>
+            <a:ext cx="991903" cy="720080"/>
+          </a:xfrm>
+          <a:prstGeom prst="ellipse">
+            <a:avLst/>
+          </a:prstGeom>
+          <a:noFill/>
+          <a:ln>
+            <a:solidFill>
+              <a:schemeClr val="accent4"/>
+            </a:solidFill>
+          </a:ln>
+        </p:spPr>
+        <p:style>
+          <a:lnRef idx="2">
+            <a:schemeClr val="accent1">
+              <a:shade val="50000"/>
+            </a:schemeClr>
+          </a:lnRef>
+          <a:fillRef idx="1">
+            <a:schemeClr val="accent1"/>
+          </a:fillRef>
+          <a:effectRef idx="0">
+            <a:schemeClr val="accent1"/>
+          </a:effectRef>
+          <a:fontRef idx="minor">
+            <a:schemeClr val="lt1"/>
+          </a:fontRef>
+        </p:style>
+        <p:txBody>
+          <a:bodyPr rtlCol="0" anchor="ctr"/>
+          <a:lstStyle/>
+          <a:p>
+            <a:pPr algn="ctr"/>
+            <a:endParaRPr lang="en-GB"/>
+          </a:p>
+        </p:txBody>
+      </p:sp>
+      <p:sp>
+        <p:nvSpPr>
+          <p:cNvPr id="26" name="Rectangle 25">
+            <a:extLst>
+              <a:ext uri="{FF2B5EF4-FFF2-40B4-BE49-F238E27FC236}">
+                <a16:creationId xmlns:a16="http://schemas.microsoft.com/office/drawing/2014/main" id="{B81A7ABD-438B-4DB3-BD27-A809CFA2C88F}"/>
+              </a:ext>
+            </a:extLst>
+          </p:cNvPr>
+          <p:cNvSpPr/>
+          <p:nvPr/>
+        </p:nvSpPr>
+        <p:spPr>
+          <a:xfrm>
+            <a:off x="5004048" y="4103583"/>
+            <a:ext cx="3816424" cy="162307"/>
+          </a:xfrm>
+          <a:prstGeom prst="rect">
+            <a:avLst/>
+          </a:prstGeom>
+          <a:noFill/>
+          <a:ln>
+            <a:solidFill>
+              <a:schemeClr val="accent4"/>
+            </a:solidFill>
+          </a:ln>
+        </p:spPr>
+        <p:style>
+          <a:lnRef idx="2">
+            <a:schemeClr val="accent1">
+              <a:shade val="50000"/>
+            </a:schemeClr>
+          </a:lnRef>
+          <a:fillRef idx="1">
+            <a:schemeClr val="accent1"/>
+          </a:fillRef>
+          <a:effectRef idx="0">
+            <a:schemeClr val="accent1"/>
+          </a:effectRef>
+          <a:fontRef idx="minor">
+            <a:schemeClr val="lt1"/>
+          </a:fontRef>
+        </p:style>
+        <p:txBody>
+          <a:bodyPr rtlCol="0" anchor="ctr"/>
+          <a:lstStyle/>
+          <a:p>
+            <a:pPr algn="ctr"/>
+            <a:endParaRPr lang="en-GB"/>
+          </a:p>
+        </p:txBody>
+      </p:sp>
+      <p:sp>
+        <p:nvSpPr>
+          <p:cNvPr id="27" name="Oval 26">
+            <a:extLst>
+              <a:ext uri="{FF2B5EF4-FFF2-40B4-BE49-F238E27FC236}">
+                <a16:creationId xmlns:a16="http://schemas.microsoft.com/office/drawing/2014/main" id="{6A080F4A-A3D3-41C5-92ED-44AA05E17AE1}"/>
+              </a:ext>
+            </a:extLst>
+          </p:cNvPr>
+          <p:cNvSpPr/>
+          <p:nvPr/>
+        </p:nvSpPr>
+        <p:spPr>
+          <a:xfrm>
+            <a:off x="3553189" y="5238100"/>
+            <a:ext cx="991903" cy="720080"/>
+          </a:xfrm>
+          <a:prstGeom prst="ellipse">
+            <a:avLst/>
+          </a:prstGeom>
+          <a:noFill/>
+          <a:ln>
+            <a:solidFill>
+              <a:schemeClr val="accent6"/>
+            </a:solidFill>
+          </a:ln>
+        </p:spPr>
+        <p:style>
+          <a:lnRef idx="2">
+            <a:schemeClr val="accent1">
+              <a:shade val="50000"/>
+            </a:schemeClr>
+          </a:lnRef>
+          <a:fillRef idx="1">
+            <a:schemeClr val="accent1"/>
+          </a:fillRef>
+          <a:effectRef idx="0">
+            <a:schemeClr val="accent1"/>
+          </a:effectRef>
+          <a:fontRef idx="minor">
+            <a:schemeClr val="lt1"/>
+          </a:fontRef>
+        </p:style>
+        <p:txBody>
+          <a:bodyPr rtlCol="0" anchor="ctr"/>
+          <a:lstStyle/>
+          <a:p>
+            <a:pPr algn="ctr"/>
+            <a:endParaRPr lang="en-GB"/>
+          </a:p>
+        </p:txBody>
+      </p:sp>
+      <p:sp>
+        <p:nvSpPr>
+          <p:cNvPr id="28" name="Rectangle 27">
+            <a:extLst>
+              <a:ext uri="{FF2B5EF4-FFF2-40B4-BE49-F238E27FC236}">
+                <a16:creationId xmlns:a16="http://schemas.microsoft.com/office/drawing/2014/main" id="{005DCDC8-6D5A-4F62-9744-68E79295CBA7}"/>
+              </a:ext>
+            </a:extLst>
+          </p:cNvPr>
+          <p:cNvSpPr/>
+          <p:nvPr/>
+        </p:nvSpPr>
+        <p:spPr>
+          <a:xfrm>
+            <a:off x="5004048" y="4293096"/>
+            <a:ext cx="3816424" cy="469161"/>
+          </a:xfrm>
+          <a:prstGeom prst="rect">
+            <a:avLst/>
+          </a:prstGeom>
+          <a:noFill/>
+          <a:ln>
+            <a:solidFill>
+              <a:schemeClr val="accent6"/>
+            </a:solidFill>
+          </a:ln>
+        </p:spPr>
+        <p:style>
+          <a:lnRef idx="2">
+            <a:schemeClr val="accent1">
+              <a:shade val="50000"/>
+            </a:schemeClr>
+          </a:lnRef>
+          <a:fillRef idx="1">
+            <a:schemeClr val="accent1"/>
+          </a:fillRef>
+          <a:effectRef idx="0">
+            <a:schemeClr val="accent1"/>
+          </a:effectRef>
+          <a:fontRef idx="minor">
+            <a:schemeClr val="lt1"/>
+          </a:fontRef>
+        </p:style>
+        <p:txBody>
+          <a:bodyPr rtlCol="0" anchor="ctr"/>
+          <a:lstStyle/>
+          <a:p>
+            <a:pPr algn="ctr"/>
+            <a:endParaRPr lang="en-GB"/>
+          </a:p>
+        </p:txBody>
+      </p:sp>
+      <p:sp>
+        <p:nvSpPr>
+          <p:cNvPr id="29" name="Rectangle 28">
+            <a:extLst>
+              <a:ext uri="{FF2B5EF4-FFF2-40B4-BE49-F238E27FC236}">
+                <a16:creationId xmlns:a16="http://schemas.microsoft.com/office/drawing/2014/main" id="{F2163D82-97F8-4402-8292-9D4D508B040A}"/>
+              </a:ext>
+            </a:extLst>
+          </p:cNvPr>
+          <p:cNvSpPr/>
+          <p:nvPr/>
+        </p:nvSpPr>
+        <p:spPr>
+          <a:xfrm>
+            <a:off x="4968044" y="5001369"/>
+            <a:ext cx="3888432" cy="370106"/>
+          </a:xfrm>
+          <a:prstGeom prst="rect">
+            <a:avLst/>
+          </a:prstGeom>
+          <a:noFill/>
+        </p:spPr>
+        <p:style>
+          <a:lnRef idx="2">
+            <a:schemeClr val="accent1">
+              <a:shade val="50000"/>
+            </a:schemeClr>
+          </a:lnRef>
+          <a:fillRef idx="1">
+            <a:schemeClr val="accent1"/>
+          </a:fillRef>
+          <a:effectRef idx="0">
+            <a:schemeClr val="accent1"/>
+          </a:effectRef>
+          <a:fontRef idx="minor">
+            <a:schemeClr val="lt1"/>
+          </a:fontRef>
+        </p:style>
+        <p:txBody>
+          <a:bodyPr rtlCol="0" anchor="ctr"/>
+          <a:lstStyle/>
+          <a:p>
+            <a:pPr algn="ctr"/>
+            <a:endParaRPr lang="en-GB"/>
+          </a:p>
+        </p:txBody>
+      </p:sp>
+      <p:sp>
+        <p:nvSpPr>
+          <p:cNvPr id="30" name="Rectangle 29">
+            <a:extLst>
+              <a:ext uri="{FF2B5EF4-FFF2-40B4-BE49-F238E27FC236}">
+                <a16:creationId xmlns:a16="http://schemas.microsoft.com/office/drawing/2014/main" id="{5C03653B-47D6-4881-BE26-FBEE664B0E52}"/>
+              </a:ext>
+            </a:extLst>
+          </p:cNvPr>
+          <p:cNvSpPr/>
+          <p:nvPr/>
+        </p:nvSpPr>
+        <p:spPr>
+          <a:xfrm>
+            <a:off x="4968044" y="6048294"/>
+            <a:ext cx="3888432" cy="405041"/>
+          </a:xfrm>
+          <a:prstGeom prst="rect">
+            <a:avLst/>
+          </a:prstGeom>
+          <a:noFill/>
+        </p:spPr>
+        <p:style>
+          <a:lnRef idx="2">
+            <a:schemeClr val="accent1">
+              <a:shade val="50000"/>
+            </a:schemeClr>
+          </a:lnRef>
+          <a:fillRef idx="1">
+            <a:schemeClr val="accent1"/>
+          </a:fillRef>
+          <a:effectRef idx="0">
+            <a:schemeClr val="accent1"/>
+          </a:effectRef>
+          <a:fontRef idx="minor">
+            <a:schemeClr val="lt1"/>
+          </a:fontRef>
+        </p:style>
+        <p:txBody>
+          <a:bodyPr rtlCol="0" anchor="ctr"/>
+          <a:lstStyle/>
+          <a:p>
+            <a:pPr algn="ctr"/>
+            <a:endParaRPr lang="en-GB"/>
+          </a:p>
+        </p:txBody>
+      </p:sp>
+    </p:spTree>
+    <p:extLst>
+      <p:ext uri="{BB962C8B-B14F-4D97-AF65-F5344CB8AC3E}">
+        <p14:creationId xmlns:p14="http://schemas.microsoft.com/office/powerpoint/2010/main" val="661995421"/>
+      </p:ext>
+    </p:extLst>
+  </p:cSld>
+  <p:clrMapOvr>
+    <a:masterClrMapping/>
+  </p:clrMapOvr>
+</p:sld>
+</file>
+
+<file path=ppt/slides/slide11.xml><?xml version="1.0" encoding="utf-8"?>
+<p:sld xmlns:a="http://schemas.openxmlformats.org/drawingml/2006/main" xmlns:r="http://schemas.openxmlformats.org/officeDocument/2006/relationships" xmlns:p="http://schemas.openxmlformats.org/presentationml/2006/main">
+  <p:cSld>
+    <p:spTree>
+      <p:nvGrpSpPr>
+        <p:cNvPr id="1" name=""/>
+        <p:cNvGrpSpPr/>
+        <p:nvPr/>
+      </p:nvGrpSpPr>
+      <p:grpSpPr>
+        <a:xfrm>
+          <a:off x="0" y="0"/>
+          <a:ext cx="0" cy="0"/>
+          <a:chOff x="0" y="0"/>
+          <a:chExt cx="0" cy="0"/>
+        </a:xfrm>
+      </p:grpSpPr>
+      <p:sp>
+        <p:nvSpPr>
+          <p:cNvPr id="3" name="TextBox 2">
+            <a:extLst>
+              <a:ext uri="{FF2B5EF4-FFF2-40B4-BE49-F238E27FC236}">
+                <a16:creationId xmlns:a16="http://schemas.microsoft.com/office/drawing/2014/main" id="{321B7D68-89BC-44E2-90E3-338D9ED55DC5}"/>
+              </a:ext>
+            </a:extLst>
+          </p:cNvPr>
+          <p:cNvSpPr txBox="1"/>
+          <p:nvPr/>
+        </p:nvSpPr>
+        <p:spPr>
+          <a:xfrm>
+            <a:off x="611560" y="404664"/>
+            <a:ext cx="237566" cy="369332"/>
+          </a:xfrm>
+          <a:prstGeom prst="rect">
+            <a:avLst/>
+          </a:prstGeom>
+          <a:noFill/>
+        </p:spPr>
+        <p:txBody>
+          <a:bodyPr wrap="none" rtlCol="0">
+            <a:spAutoFit/>
+          </a:bodyPr>
+          <a:lstStyle/>
+          <a:p>
+            <a:r>
+              <a:rPr lang="en-GB" dirty="0"/>
+              <a:t> </a:t>
+            </a:r>
+          </a:p>
+        </p:txBody>
+      </p:sp>
+      <p:sp>
+        <p:nvSpPr>
+          <p:cNvPr id="4" name="Title 2">
+            <a:extLst>
+              <a:ext uri="{FF2B5EF4-FFF2-40B4-BE49-F238E27FC236}">
+                <a16:creationId xmlns:a16="http://schemas.microsoft.com/office/drawing/2014/main" id="{7E1C909B-4F36-4DBD-B41C-8A88A6C378AC}"/>
+              </a:ext>
+            </a:extLst>
+          </p:cNvPr>
+          <p:cNvSpPr txBox="1">
+            <a:spLocks/>
+          </p:cNvSpPr>
+          <p:nvPr/>
+        </p:nvSpPr>
+        <p:spPr>
+          <a:xfrm>
+            <a:off x="467544" y="215886"/>
+            <a:ext cx="8208912" cy="720080"/>
+          </a:xfrm>
+          <a:prstGeom prst="rect">
+            <a:avLst/>
+          </a:prstGeom>
+        </p:spPr>
+        <p:txBody>
+          <a:bodyPr/>
+          <a:lstStyle>
+            <a:lvl1pPr algn="l" defTabSz="914400" rtl="0" eaLnBrk="1" latinLnBrk="0" hangingPunct="1">
+              <a:spcBef>
+                <a:spcPct val="0"/>
+              </a:spcBef>
+              <a:buNone/>
+              <a:defRPr sz="4000" kern="1200">
+                <a:solidFill>
+                  <a:schemeClr val="tx1"/>
+                </a:solidFill>
+                <a:latin typeface="Arial" pitchFamily="34" charset="0"/>
+                <a:ea typeface="+mj-ea"/>
+                <a:cs typeface="Arial" pitchFamily="34" charset="0"/>
+              </a:defRPr>
+            </a:lvl1pPr>
+          </a:lstStyle>
+          <a:p>
+            <a:r>
+              <a:rPr lang="en-GB" dirty="0"/>
+              <a:t>Extensibility</a:t>
+            </a:r>
+          </a:p>
+        </p:txBody>
+      </p:sp>
+      <p:sp>
+        <p:nvSpPr>
+          <p:cNvPr id="7" name="Content Placeholder 1">
+            <a:extLst>
+              <a:ext uri="{FF2B5EF4-FFF2-40B4-BE49-F238E27FC236}">
+                <a16:creationId xmlns:a16="http://schemas.microsoft.com/office/drawing/2014/main" id="{3817D137-59B3-47AB-96DD-216E85B61590}"/>
+              </a:ext>
+            </a:extLst>
+          </p:cNvPr>
+          <p:cNvSpPr txBox="1">
+            <a:spLocks/>
+          </p:cNvSpPr>
+          <p:nvPr/>
+        </p:nvSpPr>
+        <p:spPr>
+          <a:xfrm>
+            <a:off x="457200" y="1484784"/>
+            <a:ext cx="8229600" cy="4968552"/>
+          </a:xfrm>
+          <a:prstGeom prst="rect">
+            <a:avLst/>
+          </a:prstGeom>
+        </p:spPr>
+        <p:txBody>
+          <a:bodyPr>
+            <a:normAutofit fontScale="92500"/>
+          </a:bodyPr>
+          <a:lstStyle>
+            <a:lvl1pPr marL="342900" indent="-342900" algn="l" defTabSz="914400" rtl="0" eaLnBrk="1" latinLnBrk="0" hangingPunct="1">
+              <a:spcBef>
+                <a:spcPct val="20000"/>
+              </a:spcBef>
+              <a:buFont typeface="Arial" pitchFamily="34" charset="0"/>
+              <a:buChar char="•"/>
+              <a:defRPr sz="3200" kern="1200">
+                <a:solidFill>
+                  <a:schemeClr val="tx1"/>
+                </a:solidFill>
+                <a:latin typeface="Arial" pitchFamily="34" charset="0"/>
+                <a:ea typeface="+mn-ea"/>
+                <a:cs typeface="Arial" pitchFamily="34" charset="0"/>
+              </a:defRPr>
+            </a:lvl1pPr>
+            <a:lvl2pPr marL="742950" indent="-285750" algn="l" defTabSz="914400" rtl="0" eaLnBrk="1" latinLnBrk="0" hangingPunct="1">
+              <a:spcBef>
+                <a:spcPct val="20000"/>
+              </a:spcBef>
+              <a:buFont typeface="Arial" pitchFamily="34" charset="0"/>
+              <a:buChar char="–"/>
+              <a:defRPr sz="2800" kern="1200">
+                <a:solidFill>
+                  <a:schemeClr val="tx1"/>
+                </a:solidFill>
+                <a:latin typeface="Arial" pitchFamily="34" charset="0"/>
+                <a:ea typeface="+mn-ea"/>
+                <a:cs typeface="Arial" pitchFamily="34" charset="0"/>
+              </a:defRPr>
+            </a:lvl2pPr>
+            <a:lvl3pPr marL="1143000" indent="-228600" algn="l" defTabSz="914400" rtl="0" eaLnBrk="1" latinLnBrk="0" hangingPunct="1">
+              <a:spcBef>
+                <a:spcPct val="20000"/>
+              </a:spcBef>
+              <a:buFont typeface="Arial" pitchFamily="34" charset="0"/>
+              <a:buChar char="•"/>
+              <a:defRPr sz="2400" kern="1200">
+                <a:solidFill>
+                  <a:schemeClr val="tx1"/>
+                </a:solidFill>
+                <a:latin typeface="Arial" pitchFamily="34" charset="0"/>
+                <a:ea typeface="+mn-ea"/>
+                <a:cs typeface="Arial" pitchFamily="34" charset="0"/>
+              </a:defRPr>
+            </a:lvl3pPr>
+            <a:lvl4pPr marL="1600200" indent="-228600" algn="l" defTabSz="914400" rtl="0" eaLnBrk="1" latinLnBrk="0" hangingPunct="1">
+              <a:spcBef>
+                <a:spcPct val="20000"/>
+              </a:spcBef>
+              <a:buFont typeface="Arial" pitchFamily="34" charset="0"/>
+              <a:buChar char="–"/>
+              <a:defRPr sz="2000" kern="1200">
+                <a:solidFill>
+                  <a:schemeClr val="tx1"/>
+                </a:solidFill>
+                <a:latin typeface="Arial" pitchFamily="34" charset="0"/>
+                <a:ea typeface="+mn-ea"/>
+                <a:cs typeface="Arial" pitchFamily="34" charset="0"/>
+              </a:defRPr>
+            </a:lvl4pPr>
+            <a:lvl5pPr marL="2057400" indent="-228600" algn="l" defTabSz="914400" rtl="0" eaLnBrk="1" latinLnBrk="0" hangingPunct="1">
+              <a:spcBef>
+                <a:spcPct val="20000"/>
+              </a:spcBef>
+              <a:buFont typeface="Arial" pitchFamily="34" charset="0"/>
+              <a:buChar char="»"/>
+              <a:defRPr sz="2000" kern="1200">
+                <a:solidFill>
+                  <a:schemeClr val="tx1"/>
+                </a:solidFill>
+                <a:latin typeface="Arial" pitchFamily="34" charset="0"/>
+                <a:ea typeface="+mn-ea"/>
+                <a:cs typeface="Arial" pitchFamily="34" charset="0"/>
+              </a:defRPr>
+            </a:lvl5pPr>
+            <a:lvl6pPr marL="2514600" indent="-228600" algn="l" defTabSz="914400" rtl="0" eaLnBrk="1" latinLnBrk="0" hangingPunct="1">
+              <a:spcBef>
+                <a:spcPct val="20000"/>
+              </a:spcBef>
+              <a:buFont typeface="Arial" pitchFamily="34" charset="0"/>
+              <a:buChar char="•"/>
+              <a:defRPr sz="2000" kern="1200">
+                <a:solidFill>
+                  <a:schemeClr val="tx1"/>
+                </a:solidFill>
+                <a:latin typeface="+mn-lt"/>
+                <a:ea typeface="+mn-ea"/>
+                <a:cs typeface="+mn-cs"/>
+              </a:defRPr>
+            </a:lvl6pPr>
+            <a:lvl7pPr marL="2971800" indent="-228600" algn="l" defTabSz="914400" rtl="0" eaLnBrk="1" latinLnBrk="0" hangingPunct="1">
+              <a:spcBef>
+                <a:spcPct val="20000"/>
+              </a:spcBef>
+              <a:buFont typeface="Arial" pitchFamily="34" charset="0"/>
+              <a:buChar char="•"/>
+              <a:defRPr sz="2000" kern="1200">
+                <a:solidFill>
+                  <a:schemeClr val="tx1"/>
+                </a:solidFill>
+                <a:latin typeface="+mn-lt"/>
+                <a:ea typeface="+mn-ea"/>
+                <a:cs typeface="+mn-cs"/>
+              </a:defRPr>
+            </a:lvl7pPr>
+            <a:lvl8pPr marL="3429000" indent="-228600" algn="l" defTabSz="914400" rtl="0" eaLnBrk="1" latinLnBrk="0" hangingPunct="1">
+              <a:spcBef>
+                <a:spcPct val="20000"/>
+              </a:spcBef>
+              <a:buFont typeface="Arial" pitchFamily="34" charset="0"/>
+              <a:buChar char="•"/>
+              <a:defRPr sz="2000" kern="1200">
+                <a:solidFill>
+                  <a:schemeClr val="tx1"/>
+                </a:solidFill>
+                <a:latin typeface="+mn-lt"/>
+                <a:ea typeface="+mn-ea"/>
+                <a:cs typeface="+mn-cs"/>
+              </a:defRPr>
+            </a:lvl8pPr>
+            <a:lvl9pPr marL="3886200" indent="-228600" algn="l" defTabSz="914400" rtl="0" eaLnBrk="1" latinLnBrk="0" hangingPunct="1">
+              <a:spcBef>
+                <a:spcPct val="20000"/>
+              </a:spcBef>
+              <a:buFont typeface="Arial" pitchFamily="34" charset="0"/>
+              <a:buChar char="•"/>
+              <a:defRPr sz="2000" kern="1200">
+                <a:solidFill>
+                  <a:schemeClr val="tx1"/>
+                </a:solidFill>
+                <a:latin typeface="+mn-lt"/>
+                <a:ea typeface="+mn-ea"/>
+                <a:cs typeface="+mn-cs"/>
+              </a:defRPr>
+            </a:lvl9pPr>
+          </a:lstStyle>
+          <a:p>
+            <a:r>
+              <a:rPr lang="en-GB" dirty="0"/>
+              <a:t>Decoupling -&gt; easy addition of new features. </a:t>
+            </a:r>
+          </a:p>
+          <a:p>
+            <a:r>
+              <a:rPr lang="en-GB" dirty="0"/>
+              <a:t>Simple data structures -&gt; can create new views and span the DB in many ways</a:t>
+            </a:r>
+          </a:p>
+          <a:p>
+            <a:r>
+              <a:rPr lang="en-GB" dirty="0"/>
+              <a:t>Highly normalised DB -&gt; changes can be made painlessly, and additional data sources can be brought in with little or no updating.</a:t>
+            </a:r>
+          </a:p>
+          <a:p>
+            <a:r>
+              <a:rPr lang="en-GB" dirty="0"/>
+              <a:t>Example: Could connect to existing DBs of staff, or classes easily to combine data into meaningful views</a:t>
+            </a:r>
+          </a:p>
+          <a:p>
+            <a:endParaRPr lang="en-GB" dirty="0"/>
+          </a:p>
+        </p:txBody>
+      </p:sp>
+    </p:spTree>
+    <p:extLst>
+      <p:ext uri="{BB962C8B-B14F-4D97-AF65-F5344CB8AC3E}">
+        <p14:creationId xmlns:p14="http://schemas.microsoft.com/office/powerpoint/2010/main" val="373628128"/>
+      </p:ext>
+    </p:extLst>
+  </p:cSld>
+  <p:clrMapOvr>
+    <a:masterClrMapping/>
+  </p:clrMapOvr>
+</p:sld>
+</file>
+
+<file path=ppt/slides/slide12.xml><?xml version="1.0" encoding="utf-8"?>
+<p:sld xmlns:a="http://schemas.openxmlformats.org/drawingml/2006/main" xmlns:r="http://schemas.openxmlformats.org/officeDocument/2006/relationships" xmlns:p="http://schemas.openxmlformats.org/presentationml/2006/main">
+  <p:cSld>
+    <p:bg>
+      <p:bgPr>
+        <a:blipFill dpi="0" rotWithShape="1">
+          <a:blip r:embed="rId2">
+            <a:lum/>
+          </a:blip>
+          <a:srcRect/>
+          <a:stretch>
+            <a:fillRect/>
+          </a:stretch>
+        </a:blipFill>
+        <a:effectLst/>
+      </p:bgPr>
+    </p:bg>
+    <p:spTree>
+      <p:nvGrpSpPr>
+        <p:cNvPr id="1" name=""/>
+        <p:cNvGrpSpPr/>
+        <p:nvPr/>
+      </p:nvGrpSpPr>
+      <p:grpSpPr>
+        <a:xfrm>
+          <a:off x="0" y="0"/>
+          <a:ext cx="0" cy="0"/>
+          <a:chOff x="0" y="0"/>
+          <a:chExt cx="0" cy="0"/>
+        </a:xfrm>
+      </p:grpSpPr>
+    </p:spTree>
+    <p:extLst>
+      <p:ext uri="{BB962C8B-B14F-4D97-AF65-F5344CB8AC3E}">
+        <p14:creationId xmlns:p14="http://schemas.microsoft.com/office/powerpoint/2010/main" val="2857295147"/>
+      </p:ext>
+    </p:extLst>
+  </p:cSld>
+  <p:clrMapOvr>
+    <a:masterClrMapping/>
+  </p:clrMapOvr>
 </p:sld>
 </file>
 
@@ -3498,18 +4336,6 @@
   <p:clrMapOvr>
     <a:masterClrMapping/>
   </p:clrMapOvr>
-  <mc:AlternateContent xmlns:mc="http://schemas.openxmlformats.org/markup-compatibility/2006" xmlns:p14="http://schemas.microsoft.com/office/powerpoint/2010/main">
-    <mc:Choice Requires="p14">
-      <p:transition spd="slow" p14:dur="1600">
-        <p14:prism isInverted="1"/>
-      </p:transition>
-    </mc:Choice>
-    <mc:Fallback xmlns="">
-      <p:transition spd="slow">
-        <p:fade/>
-      </p:transition>
-    </mc:Fallback>
-  </mc:AlternateContent>
 </p:sld>
 </file>
 
@@ -3647,22 +4473,961 @@
   <p:clrMapOvr>
     <a:masterClrMapping/>
   </p:clrMapOvr>
-  <mc:AlternateContent xmlns:mc="http://schemas.openxmlformats.org/markup-compatibility/2006" xmlns:p14="http://schemas.microsoft.com/office/powerpoint/2010/main">
-    <mc:Choice Requires="p14">
-      <p:transition spd="slow" p14:dur="1600">
-        <p14:prism isInverted="1"/>
-      </p:transition>
-    </mc:Choice>
-    <mc:Fallback xmlns="">
-      <p:transition spd="slow">
-        <p:fade/>
-      </p:transition>
-    </mc:Fallback>
-  </mc:AlternateContent>
 </p:sld>
 </file>
 
 <file path=ppt/slides/slide4.xml><?xml version="1.0" encoding="utf-8"?>
+<p:sld xmlns:a="http://schemas.openxmlformats.org/drawingml/2006/main" xmlns:r="http://schemas.openxmlformats.org/officeDocument/2006/relationships" xmlns:p="http://schemas.openxmlformats.org/presentationml/2006/main">
+  <p:cSld>
+    <p:spTree>
+      <p:nvGrpSpPr>
+        <p:cNvPr id="1" name=""/>
+        <p:cNvGrpSpPr/>
+        <p:nvPr/>
+      </p:nvGrpSpPr>
+      <p:grpSpPr>
+        <a:xfrm>
+          <a:off x="0" y="0"/>
+          <a:ext cx="0" cy="0"/>
+          <a:chOff x="0" y="0"/>
+          <a:chExt cx="0" cy="0"/>
+        </a:xfrm>
+      </p:grpSpPr>
+      <p:sp>
+        <p:nvSpPr>
+          <p:cNvPr id="3" name="TextBox 2">
+            <a:extLst>
+              <a:ext uri="{FF2B5EF4-FFF2-40B4-BE49-F238E27FC236}">
+                <a16:creationId xmlns:a16="http://schemas.microsoft.com/office/drawing/2014/main" id="{321B7D68-89BC-44E2-90E3-338D9ED55DC5}"/>
+              </a:ext>
+            </a:extLst>
+          </p:cNvPr>
+          <p:cNvSpPr txBox="1"/>
+          <p:nvPr/>
+        </p:nvSpPr>
+        <p:spPr>
+          <a:xfrm>
+            <a:off x="611560" y="404664"/>
+            <a:ext cx="237566" cy="369332"/>
+          </a:xfrm>
+          <a:prstGeom prst="rect">
+            <a:avLst/>
+          </a:prstGeom>
+          <a:noFill/>
+        </p:spPr>
+        <p:txBody>
+          <a:bodyPr wrap="none" rtlCol="0">
+            <a:spAutoFit/>
+          </a:bodyPr>
+          <a:lstStyle/>
+          <a:p>
+            <a:r>
+              <a:rPr lang="en-GB" dirty="0"/>
+              <a:t> </a:t>
+            </a:r>
+          </a:p>
+        </p:txBody>
+      </p:sp>
+      <p:sp>
+        <p:nvSpPr>
+          <p:cNvPr id="4" name="Title 2">
+            <a:extLst>
+              <a:ext uri="{FF2B5EF4-FFF2-40B4-BE49-F238E27FC236}">
+                <a16:creationId xmlns:a16="http://schemas.microsoft.com/office/drawing/2014/main" id="{7E1C909B-4F36-4DBD-B41C-8A88A6C378AC}"/>
+              </a:ext>
+            </a:extLst>
+          </p:cNvPr>
+          <p:cNvSpPr txBox="1">
+            <a:spLocks/>
+          </p:cNvSpPr>
+          <p:nvPr/>
+        </p:nvSpPr>
+        <p:spPr>
+          <a:xfrm>
+            <a:off x="467544" y="215886"/>
+            <a:ext cx="8208912" cy="720080"/>
+          </a:xfrm>
+          <a:prstGeom prst="rect">
+            <a:avLst/>
+          </a:prstGeom>
+        </p:spPr>
+        <p:txBody>
+          <a:bodyPr/>
+          <a:lstStyle>
+            <a:lvl1pPr algn="l" defTabSz="914400" rtl="0" eaLnBrk="1" latinLnBrk="0" hangingPunct="1">
+              <a:spcBef>
+                <a:spcPct val="0"/>
+              </a:spcBef>
+              <a:buNone/>
+              <a:defRPr sz="4000" kern="1200">
+                <a:solidFill>
+                  <a:schemeClr val="tx1"/>
+                </a:solidFill>
+                <a:latin typeface="Arial" pitchFamily="34" charset="0"/>
+                <a:ea typeface="+mj-ea"/>
+                <a:cs typeface="Arial" pitchFamily="34" charset="0"/>
+              </a:defRPr>
+            </a:lvl1pPr>
+          </a:lstStyle>
+          <a:p>
+            <a:r>
+              <a:rPr lang="en-GB" dirty="0"/>
+              <a:t>Sample MDF – Old Vs New</a:t>
+            </a:r>
+          </a:p>
+        </p:txBody>
+      </p:sp>
+      <p:pic>
+        <p:nvPicPr>
+          <p:cNvPr id="8" name="Picture 7">
+            <a:extLst>
+              <a:ext uri="{FF2B5EF4-FFF2-40B4-BE49-F238E27FC236}">
+                <a16:creationId xmlns:a16="http://schemas.microsoft.com/office/drawing/2014/main" id="{240E8D31-1047-4B83-9C06-302DDBD3B90B}"/>
+              </a:ext>
+            </a:extLst>
+          </p:cNvPr>
+          <p:cNvPicPr>
+            <a:picLocks noChangeAspect="1"/>
+          </p:cNvPicPr>
+          <p:nvPr/>
+        </p:nvPicPr>
+        <p:blipFill rotWithShape="1">
+          <a:blip r:embed="rId2">
+            <a:extLst>
+              <a:ext uri="{28A0092B-C50C-407E-A947-70E740481C1C}">
+                <a14:useLocalDpi xmlns:a14="http://schemas.microsoft.com/office/drawing/2010/main" val="0"/>
+              </a:ext>
+            </a:extLst>
+          </a:blip>
+          <a:srcRect l="1957"/>
+          <a:stretch/>
+        </p:blipFill>
+        <p:spPr>
+          <a:xfrm>
+            <a:off x="0" y="2204864"/>
+            <a:ext cx="4572000" cy="4680520"/>
+          </a:xfrm>
+          <a:prstGeom prst="rect">
+            <a:avLst/>
+          </a:prstGeom>
+        </p:spPr>
+      </p:pic>
+      <p:pic>
+        <p:nvPicPr>
+          <p:cNvPr id="2" name="Picture 1">
+            <a:extLst>
+              <a:ext uri="{FF2B5EF4-FFF2-40B4-BE49-F238E27FC236}">
+                <a16:creationId xmlns:a16="http://schemas.microsoft.com/office/drawing/2014/main" id="{0AF1BA69-D7B6-4FDC-8B48-A32C07C4791D}"/>
+              </a:ext>
+            </a:extLst>
+          </p:cNvPr>
+          <p:cNvPicPr>
+            <a:picLocks noChangeAspect="1"/>
+          </p:cNvPicPr>
+          <p:nvPr/>
+        </p:nvPicPr>
+        <p:blipFill rotWithShape="1">
+          <a:blip r:embed="rId3"/>
+          <a:srcRect l="61813" t="28846" r="13042" b="5665"/>
+          <a:stretch/>
+        </p:blipFill>
+        <p:spPr>
+          <a:xfrm>
+            <a:off x="4545093" y="2204864"/>
+            <a:ext cx="4598907" cy="4680520"/>
+          </a:xfrm>
+          <a:prstGeom prst="rect">
+            <a:avLst/>
+          </a:prstGeom>
+        </p:spPr>
+      </p:pic>
+      <p:sp>
+        <p:nvSpPr>
+          <p:cNvPr id="9" name="TextBox 8">
+            <a:extLst>
+              <a:ext uri="{FF2B5EF4-FFF2-40B4-BE49-F238E27FC236}">
+                <a16:creationId xmlns:a16="http://schemas.microsoft.com/office/drawing/2014/main" id="{B765869E-0813-409F-A65B-768D1F706867}"/>
+              </a:ext>
+            </a:extLst>
+          </p:cNvPr>
+          <p:cNvSpPr txBox="1"/>
+          <p:nvPr/>
+        </p:nvSpPr>
+        <p:spPr>
+          <a:xfrm>
+            <a:off x="395536" y="1486525"/>
+            <a:ext cx="7641964" cy="646331"/>
+          </a:xfrm>
+          <a:prstGeom prst="rect">
+            <a:avLst/>
+          </a:prstGeom>
+          <a:noFill/>
+        </p:spPr>
+        <p:txBody>
+          <a:bodyPr wrap="none" rtlCol="0">
+            <a:spAutoFit/>
+          </a:bodyPr>
+          <a:lstStyle/>
+          <a:p>
+            <a:r>
+              <a:rPr lang="en-GB" dirty="0"/>
+              <a:t>We can easily pull all the same data back out, and it can look however we want.</a:t>
+            </a:r>
+          </a:p>
+          <a:p>
+            <a:r>
+              <a:rPr lang="en-GB" dirty="0"/>
+              <a:t>Colour and other aesthetics are easy to change.</a:t>
+            </a:r>
+          </a:p>
+        </p:txBody>
+      </p:sp>
+    </p:spTree>
+    <p:extLst>
+      <p:ext uri="{BB962C8B-B14F-4D97-AF65-F5344CB8AC3E}">
+        <p14:creationId xmlns:p14="http://schemas.microsoft.com/office/powerpoint/2010/main" val="2323499326"/>
+      </p:ext>
+    </p:extLst>
+  </p:cSld>
+  <p:clrMapOvr>
+    <a:masterClrMapping/>
+  </p:clrMapOvr>
+</p:sld>
+</file>
+
+<file path=ppt/slides/slide5.xml><?xml version="1.0" encoding="utf-8"?>
+<p:sld xmlns:a="http://schemas.openxmlformats.org/drawingml/2006/main" xmlns:r="http://schemas.openxmlformats.org/officeDocument/2006/relationships" xmlns:p="http://schemas.openxmlformats.org/presentationml/2006/main">
+  <p:cSld>
+    <p:spTree>
+      <p:nvGrpSpPr>
+        <p:cNvPr id="1" name=""/>
+        <p:cNvGrpSpPr/>
+        <p:nvPr/>
+      </p:nvGrpSpPr>
+      <p:grpSpPr>
+        <a:xfrm>
+          <a:off x="0" y="0"/>
+          <a:ext cx="0" cy="0"/>
+          <a:chOff x="0" y="0"/>
+          <a:chExt cx="0" cy="0"/>
+        </a:xfrm>
+      </p:grpSpPr>
+      <p:sp>
+        <p:nvSpPr>
+          <p:cNvPr id="3" name="TextBox 2">
+            <a:extLst>
+              <a:ext uri="{FF2B5EF4-FFF2-40B4-BE49-F238E27FC236}">
+                <a16:creationId xmlns:a16="http://schemas.microsoft.com/office/drawing/2014/main" id="{321B7D68-89BC-44E2-90E3-338D9ED55DC5}"/>
+              </a:ext>
+            </a:extLst>
+          </p:cNvPr>
+          <p:cNvSpPr txBox="1"/>
+          <p:nvPr/>
+        </p:nvSpPr>
+        <p:spPr>
+          <a:xfrm>
+            <a:off x="611560" y="404664"/>
+            <a:ext cx="237566" cy="369332"/>
+          </a:xfrm>
+          <a:prstGeom prst="rect">
+            <a:avLst/>
+          </a:prstGeom>
+          <a:noFill/>
+        </p:spPr>
+        <p:txBody>
+          <a:bodyPr wrap="none" rtlCol="0">
+            <a:spAutoFit/>
+          </a:bodyPr>
+          <a:lstStyle/>
+          <a:p>
+            <a:r>
+              <a:rPr lang="en-GB" dirty="0"/>
+              <a:t> </a:t>
+            </a:r>
+          </a:p>
+        </p:txBody>
+      </p:sp>
+      <p:sp>
+        <p:nvSpPr>
+          <p:cNvPr id="4" name="Title 2">
+            <a:extLst>
+              <a:ext uri="{FF2B5EF4-FFF2-40B4-BE49-F238E27FC236}">
+                <a16:creationId xmlns:a16="http://schemas.microsoft.com/office/drawing/2014/main" id="{7E1C909B-4F36-4DBD-B41C-8A88A6C378AC}"/>
+              </a:ext>
+            </a:extLst>
+          </p:cNvPr>
+          <p:cNvSpPr txBox="1">
+            <a:spLocks/>
+          </p:cNvSpPr>
+          <p:nvPr/>
+        </p:nvSpPr>
+        <p:spPr>
+          <a:xfrm>
+            <a:off x="467544" y="215886"/>
+            <a:ext cx="8208912" cy="720080"/>
+          </a:xfrm>
+          <a:prstGeom prst="rect">
+            <a:avLst/>
+          </a:prstGeom>
+        </p:spPr>
+        <p:txBody>
+          <a:bodyPr/>
+          <a:lstStyle>
+            <a:lvl1pPr algn="l" defTabSz="914400" rtl="0" eaLnBrk="1" latinLnBrk="0" hangingPunct="1">
+              <a:spcBef>
+                <a:spcPct val="0"/>
+              </a:spcBef>
+              <a:buNone/>
+              <a:defRPr sz="4000" kern="1200">
+                <a:solidFill>
+                  <a:schemeClr val="tx1"/>
+                </a:solidFill>
+                <a:latin typeface="Arial" pitchFamily="34" charset="0"/>
+                <a:ea typeface="+mj-ea"/>
+                <a:cs typeface="Arial" pitchFamily="34" charset="0"/>
+              </a:defRPr>
+            </a:lvl1pPr>
+          </a:lstStyle>
+          <a:p>
+            <a:r>
+              <a:rPr lang="en-GB" dirty="0"/>
+              <a:t>Examination Timeline View</a:t>
+            </a:r>
+          </a:p>
+        </p:txBody>
+      </p:sp>
+      <p:pic>
+        <p:nvPicPr>
+          <p:cNvPr id="2" name="Picture 1">
+            <a:extLst>
+              <a:ext uri="{FF2B5EF4-FFF2-40B4-BE49-F238E27FC236}">
+                <a16:creationId xmlns:a16="http://schemas.microsoft.com/office/drawing/2014/main" id="{0AF1BA69-D7B6-4FDC-8B48-A32C07C4791D}"/>
+              </a:ext>
+            </a:extLst>
+          </p:cNvPr>
+          <p:cNvPicPr>
+            <a:picLocks noChangeAspect="1"/>
+          </p:cNvPicPr>
+          <p:nvPr/>
+        </p:nvPicPr>
+        <p:blipFill>
+          <a:blip r:embed="rId2">
+            <a:extLst>
+              <a:ext uri="{28A0092B-C50C-407E-A947-70E740481C1C}">
+                <a14:useLocalDpi xmlns:a14="http://schemas.microsoft.com/office/drawing/2010/main" val="0"/>
+              </a:ext>
+            </a:extLst>
+          </a:blip>
+          <a:stretch>
+            <a:fillRect/>
+          </a:stretch>
+        </p:blipFill>
+        <p:spPr>
+          <a:xfrm>
+            <a:off x="61630" y="3068960"/>
+            <a:ext cx="9071074" cy="3717032"/>
+          </a:xfrm>
+          <a:prstGeom prst="rect">
+            <a:avLst/>
+          </a:prstGeom>
+        </p:spPr>
+      </p:pic>
+      <p:sp>
+        <p:nvSpPr>
+          <p:cNvPr id="9" name="TextBox 8">
+            <a:extLst>
+              <a:ext uri="{FF2B5EF4-FFF2-40B4-BE49-F238E27FC236}">
+                <a16:creationId xmlns:a16="http://schemas.microsoft.com/office/drawing/2014/main" id="{B765869E-0813-409F-A65B-768D1F706867}"/>
+              </a:ext>
+            </a:extLst>
+          </p:cNvPr>
+          <p:cNvSpPr txBox="1"/>
+          <p:nvPr/>
+        </p:nvSpPr>
+        <p:spPr>
+          <a:xfrm>
+            <a:off x="395536" y="1486525"/>
+            <a:ext cx="8542147" cy="646331"/>
+          </a:xfrm>
+          <a:prstGeom prst="rect">
+            <a:avLst/>
+          </a:prstGeom>
+          <a:noFill/>
+        </p:spPr>
+        <p:txBody>
+          <a:bodyPr wrap="none" rtlCol="0">
+            <a:spAutoFit/>
+          </a:bodyPr>
+          <a:lstStyle/>
+          <a:p>
+            <a:r>
+              <a:rPr lang="en-GB" dirty="0"/>
+              <a:t>A new view made possible by the database representation. Shows each semester broken </a:t>
+            </a:r>
+          </a:p>
+          <a:p>
+            <a:r>
+              <a:rPr lang="en-GB" dirty="0"/>
+              <a:t>down into 11 week + Exam period timelines with all deadlines represented</a:t>
+            </a:r>
+          </a:p>
+        </p:txBody>
+      </p:sp>
+    </p:spTree>
+    <p:extLst>
+      <p:ext uri="{BB962C8B-B14F-4D97-AF65-F5344CB8AC3E}">
+        <p14:creationId xmlns:p14="http://schemas.microsoft.com/office/powerpoint/2010/main" val="3843521394"/>
+      </p:ext>
+    </p:extLst>
+  </p:cSld>
+  <p:clrMapOvr>
+    <a:masterClrMapping/>
+  </p:clrMapOvr>
+</p:sld>
+</file>
+
+<file path=ppt/slides/slide6.xml><?xml version="1.0" encoding="utf-8"?>
+<p:sld xmlns:a="http://schemas.openxmlformats.org/drawingml/2006/main" xmlns:r="http://schemas.openxmlformats.org/officeDocument/2006/relationships" xmlns:p="http://schemas.openxmlformats.org/presentationml/2006/main">
+  <p:cSld>
+    <p:spTree>
+      <p:nvGrpSpPr>
+        <p:cNvPr id="1" name=""/>
+        <p:cNvGrpSpPr/>
+        <p:nvPr/>
+      </p:nvGrpSpPr>
+      <p:grpSpPr>
+        <a:xfrm>
+          <a:off x="0" y="0"/>
+          <a:ext cx="0" cy="0"/>
+          <a:chOff x="0" y="0"/>
+          <a:chExt cx="0" cy="0"/>
+        </a:xfrm>
+      </p:grpSpPr>
+      <p:pic>
+        <p:nvPicPr>
+          <p:cNvPr id="2" name="Picture 1">
+            <a:extLst>
+              <a:ext uri="{FF2B5EF4-FFF2-40B4-BE49-F238E27FC236}">
+                <a16:creationId xmlns:a16="http://schemas.microsoft.com/office/drawing/2014/main" id="{0AF1BA69-D7B6-4FDC-8B48-A32C07C4791D}"/>
+              </a:ext>
+            </a:extLst>
+          </p:cNvPr>
+          <p:cNvPicPr>
+            <a:picLocks noChangeAspect="1"/>
+          </p:cNvPicPr>
+          <p:nvPr/>
+        </p:nvPicPr>
+        <p:blipFill rotWithShape="1">
+          <a:blip r:embed="rId2">
+            <a:extLst>
+              <a:ext uri="{28A0092B-C50C-407E-A947-70E740481C1C}">
+                <a14:useLocalDpi xmlns:a14="http://schemas.microsoft.com/office/drawing/2010/main" val="0"/>
+              </a:ext>
+            </a:extLst>
+          </a:blip>
+          <a:srcRect t="-1256" r="11920"/>
+          <a:stretch/>
+        </p:blipFill>
+        <p:spPr>
+          <a:xfrm>
+            <a:off x="4427984" y="909528"/>
+            <a:ext cx="3816424" cy="5948473"/>
+          </a:xfrm>
+          <a:prstGeom prst="snip1Rect">
+            <a:avLst>
+              <a:gd name="adj" fmla="val 37250"/>
+            </a:avLst>
+          </a:prstGeom>
+        </p:spPr>
+      </p:pic>
+      <p:sp>
+        <p:nvSpPr>
+          <p:cNvPr id="3" name="TextBox 2">
+            <a:extLst>
+              <a:ext uri="{FF2B5EF4-FFF2-40B4-BE49-F238E27FC236}">
+                <a16:creationId xmlns:a16="http://schemas.microsoft.com/office/drawing/2014/main" id="{321B7D68-89BC-44E2-90E3-338D9ED55DC5}"/>
+              </a:ext>
+            </a:extLst>
+          </p:cNvPr>
+          <p:cNvSpPr txBox="1"/>
+          <p:nvPr/>
+        </p:nvSpPr>
+        <p:spPr>
+          <a:xfrm>
+            <a:off x="611560" y="404664"/>
+            <a:ext cx="237566" cy="369332"/>
+          </a:xfrm>
+          <a:prstGeom prst="rect">
+            <a:avLst/>
+          </a:prstGeom>
+          <a:noFill/>
+        </p:spPr>
+        <p:txBody>
+          <a:bodyPr wrap="none" rtlCol="0">
+            <a:spAutoFit/>
+          </a:bodyPr>
+          <a:lstStyle/>
+          <a:p>
+            <a:r>
+              <a:rPr lang="en-GB" dirty="0"/>
+              <a:t> </a:t>
+            </a:r>
+          </a:p>
+        </p:txBody>
+      </p:sp>
+      <p:sp>
+        <p:nvSpPr>
+          <p:cNvPr id="4" name="Title 2">
+            <a:extLst>
+              <a:ext uri="{FF2B5EF4-FFF2-40B4-BE49-F238E27FC236}">
+                <a16:creationId xmlns:a16="http://schemas.microsoft.com/office/drawing/2014/main" id="{7E1C909B-4F36-4DBD-B41C-8A88A6C378AC}"/>
+              </a:ext>
+            </a:extLst>
+          </p:cNvPr>
+          <p:cNvSpPr txBox="1">
+            <a:spLocks/>
+          </p:cNvSpPr>
+          <p:nvPr/>
+        </p:nvSpPr>
+        <p:spPr>
+          <a:xfrm>
+            <a:off x="467544" y="215886"/>
+            <a:ext cx="8208912" cy="720080"/>
+          </a:xfrm>
+          <a:prstGeom prst="rect">
+            <a:avLst/>
+          </a:prstGeom>
+        </p:spPr>
+        <p:txBody>
+          <a:bodyPr/>
+          <a:lstStyle>
+            <a:lvl1pPr algn="l" defTabSz="914400" rtl="0" eaLnBrk="1" latinLnBrk="0" hangingPunct="1">
+              <a:spcBef>
+                <a:spcPct val="0"/>
+              </a:spcBef>
+              <a:buNone/>
+              <a:defRPr sz="4000" kern="1200">
+                <a:solidFill>
+                  <a:schemeClr val="tx1"/>
+                </a:solidFill>
+                <a:latin typeface="Arial" pitchFamily="34" charset="0"/>
+                <a:ea typeface="+mj-ea"/>
+                <a:cs typeface="Arial" pitchFamily="34" charset="0"/>
+              </a:defRPr>
+            </a:lvl1pPr>
+          </a:lstStyle>
+          <a:p>
+            <a:r>
+              <a:rPr lang="en-GB" dirty="0"/>
+              <a:t>Class Dependency View</a:t>
+            </a:r>
+          </a:p>
+        </p:txBody>
+      </p:sp>
+      <p:sp>
+        <p:nvSpPr>
+          <p:cNvPr id="9" name="TextBox 8">
+            <a:extLst>
+              <a:ext uri="{FF2B5EF4-FFF2-40B4-BE49-F238E27FC236}">
+                <a16:creationId xmlns:a16="http://schemas.microsoft.com/office/drawing/2014/main" id="{B765869E-0813-409F-A65B-768D1F706867}"/>
+              </a:ext>
+            </a:extLst>
+          </p:cNvPr>
+          <p:cNvSpPr txBox="1"/>
+          <p:nvPr/>
+        </p:nvSpPr>
+        <p:spPr>
+          <a:xfrm>
+            <a:off x="382639" y="1052736"/>
+            <a:ext cx="3816424" cy="3416320"/>
+          </a:xfrm>
+          <a:prstGeom prst="rect">
+            <a:avLst/>
+          </a:prstGeom>
+          <a:noFill/>
+        </p:spPr>
+        <p:txBody>
+          <a:bodyPr wrap="square" rtlCol="0">
+            <a:spAutoFit/>
+          </a:bodyPr>
+          <a:lstStyle/>
+          <a:p>
+            <a:r>
+              <a:rPr lang="en-GB" dirty="0"/>
+              <a:t>We can also span the data to </a:t>
+            </a:r>
+          </a:p>
+          <a:p>
+            <a:r>
+              <a:rPr lang="en-GB" dirty="0"/>
+              <a:t>automatically derive classes which follow on from or require one another. </a:t>
+            </a:r>
+          </a:p>
+          <a:p>
+            <a:r>
+              <a:rPr lang="en-GB" dirty="0"/>
+              <a:t>Shown here are all classes which require EE107 (→) and all classes which are required for EE468 (↓).</a:t>
+            </a:r>
+          </a:p>
+          <a:p>
+            <a:endParaRPr lang="en-GB" dirty="0"/>
+          </a:p>
+          <a:p>
+            <a:r>
+              <a:rPr lang="en-GB" dirty="0"/>
+              <a:t>Note the repetition: classes are represented under several parents. This is deliberate, to show all requirements of each class in the tree, and is easy to change for other views.</a:t>
+            </a:r>
+          </a:p>
+        </p:txBody>
+      </p:sp>
+      <p:pic>
+        <p:nvPicPr>
+          <p:cNvPr id="6" name="Picture 5">
+            <a:extLst>
+              <a:ext uri="{FF2B5EF4-FFF2-40B4-BE49-F238E27FC236}">
+                <a16:creationId xmlns:a16="http://schemas.microsoft.com/office/drawing/2014/main" id="{8FF4DE0F-F956-4FB3-885F-22EF3B33A526}"/>
+              </a:ext>
+            </a:extLst>
+          </p:cNvPr>
+          <p:cNvPicPr>
+            <a:picLocks noChangeAspect="1"/>
+          </p:cNvPicPr>
+          <p:nvPr/>
+        </p:nvPicPr>
+        <p:blipFill>
+          <a:blip r:embed="rId3">
+            <a:extLst>
+              <a:ext uri="{28A0092B-C50C-407E-A947-70E740481C1C}">
+                <a14:useLocalDpi xmlns:a14="http://schemas.microsoft.com/office/drawing/2010/main" val="0"/>
+              </a:ext>
+            </a:extLst>
+          </a:blip>
+          <a:stretch>
+            <a:fillRect/>
+          </a:stretch>
+        </p:blipFill>
+        <p:spPr>
+          <a:xfrm>
+            <a:off x="583215" y="4620184"/>
+            <a:ext cx="3562847" cy="2019582"/>
+          </a:xfrm>
+          <a:prstGeom prst="rect">
+            <a:avLst/>
+          </a:prstGeom>
+        </p:spPr>
+      </p:pic>
+    </p:spTree>
+    <p:extLst>
+      <p:ext uri="{BB962C8B-B14F-4D97-AF65-F5344CB8AC3E}">
+        <p14:creationId xmlns:p14="http://schemas.microsoft.com/office/powerpoint/2010/main" val="781175907"/>
+      </p:ext>
+    </p:extLst>
+  </p:cSld>
+  <p:clrMapOvr>
+    <a:masterClrMapping/>
+  </p:clrMapOvr>
+</p:sld>
+</file>
+
+<file path=ppt/slides/slide7.xml><?xml version="1.0" encoding="utf-8"?>
+<p:sld xmlns:a="http://schemas.openxmlformats.org/drawingml/2006/main" xmlns:r="http://schemas.openxmlformats.org/officeDocument/2006/relationships" xmlns:p="http://schemas.openxmlformats.org/presentationml/2006/main">
+  <p:cSld>
+    <p:spTree>
+      <p:nvGrpSpPr>
+        <p:cNvPr id="1" name=""/>
+        <p:cNvGrpSpPr/>
+        <p:nvPr/>
+      </p:nvGrpSpPr>
+      <p:grpSpPr>
+        <a:xfrm>
+          <a:off x="0" y="0"/>
+          <a:ext cx="0" cy="0"/>
+          <a:chOff x="0" y="0"/>
+          <a:chExt cx="0" cy="0"/>
+        </a:xfrm>
+      </p:grpSpPr>
+      <p:sp>
+        <p:nvSpPr>
+          <p:cNvPr id="3" name="TextBox 2">
+            <a:extLst>
+              <a:ext uri="{FF2B5EF4-FFF2-40B4-BE49-F238E27FC236}">
+                <a16:creationId xmlns:a16="http://schemas.microsoft.com/office/drawing/2014/main" id="{321B7D68-89BC-44E2-90E3-338D9ED55DC5}"/>
+              </a:ext>
+            </a:extLst>
+          </p:cNvPr>
+          <p:cNvSpPr txBox="1"/>
+          <p:nvPr/>
+        </p:nvSpPr>
+        <p:spPr>
+          <a:xfrm>
+            <a:off x="611560" y="404664"/>
+            <a:ext cx="237566" cy="369332"/>
+          </a:xfrm>
+          <a:prstGeom prst="rect">
+            <a:avLst/>
+          </a:prstGeom>
+          <a:noFill/>
+        </p:spPr>
+        <p:txBody>
+          <a:bodyPr wrap="none" rtlCol="0">
+            <a:spAutoFit/>
+          </a:bodyPr>
+          <a:lstStyle/>
+          <a:p>
+            <a:r>
+              <a:rPr lang="en-GB" dirty="0"/>
+              <a:t> </a:t>
+            </a:r>
+          </a:p>
+        </p:txBody>
+      </p:sp>
+      <p:sp>
+        <p:nvSpPr>
+          <p:cNvPr id="4" name="Title 2">
+            <a:extLst>
+              <a:ext uri="{FF2B5EF4-FFF2-40B4-BE49-F238E27FC236}">
+                <a16:creationId xmlns:a16="http://schemas.microsoft.com/office/drawing/2014/main" id="{7E1C909B-4F36-4DBD-B41C-8A88A6C378AC}"/>
+              </a:ext>
+            </a:extLst>
+          </p:cNvPr>
+          <p:cNvSpPr txBox="1">
+            <a:spLocks/>
+          </p:cNvSpPr>
+          <p:nvPr/>
+        </p:nvSpPr>
+        <p:spPr>
+          <a:xfrm>
+            <a:off x="467544" y="215886"/>
+            <a:ext cx="8208912" cy="720080"/>
+          </a:xfrm>
+          <a:prstGeom prst="rect">
+            <a:avLst/>
+          </a:prstGeom>
+        </p:spPr>
+        <p:txBody>
+          <a:bodyPr/>
+          <a:lstStyle>
+            <a:lvl1pPr algn="l" defTabSz="914400" rtl="0" eaLnBrk="1" latinLnBrk="0" hangingPunct="1">
+              <a:spcBef>
+                <a:spcPct val="0"/>
+              </a:spcBef>
+              <a:buNone/>
+              <a:defRPr sz="4000" kern="1200">
+                <a:solidFill>
+                  <a:schemeClr val="tx1"/>
+                </a:solidFill>
+                <a:latin typeface="Arial" pitchFamily="34" charset="0"/>
+                <a:ea typeface="+mj-ea"/>
+                <a:cs typeface="Arial" pitchFamily="34" charset="0"/>
+              </a:defRPr>
+            </a:lvl1pPr>
+          </a:lstStyle>
+          <a:p>
+            <a:r>
+              <a:rPr lang="en-GB" dirty="0"/>
+              <a:t>Example: Staff workload</a:t>
+            </a:r>
+          </a:p>
+        </p:txBody>
+      </p:sp>
+      <p:sp>
+        <p:nvSpPr>
+          <p:cNvPr id="7" name="Content Placeholder 1">
+            <a:extLst>
+              <a:ext uri="{FF2B5EF4-FFF2-40B4-BE49-F238E27FC236}">
+                <a16:creationId xmlns:a16="http://schemas.microsoft.com/office/drawing/2014/main" id="{3817D137-59B3-47AB-96DD-216E85B61590}"/>
+              </a:ext>
+            </a:extLst>
+          </p:cNvPr>
+          <p:cNvSpPr txBox="1">
+            <a:spLocks/>
+          </p:cNvSpPr>
+          <p:nvPr/>
+        </p:nvSpPr>
+        <p:spPr>
+          <a:xfrm>
+            <a:off x="457200" y="1484784"/>
+            <a:ext cx="8229600" cy="4968552"/>
+          </a:xfrm>
+          <a:prstGeom prst="rect">
+            <a:avLst/>
+          </a:prstGeom>
+        </p:spPr>
+        <p:txBody>
+          <a:bodyPr>
+            <a:normAutofit fontScale="92500"/>
+          </a:bodyPr>
+          <a:lstStyle>
+            <a:lvl1pPr marL="342900" indent="-342900" algn="l" defTabSz="914400" rtl="0" eaLnBrk="1" latinLnBrk="0" hangingPunct="1">
+              <a:spcBef>
+                <a:spcPct val="20000"/>
+              </a:spcBef>
+              <a:buFont typeface="Arial" pitchFamily="34" charset="0"/>
+              <a:buChar char="•"/>
+              <a:defRPr sz="3200" kern="1200">
+                <a:solidFill>
+                  <a:schemeClr val="tx1"/>
+                </a:solidFill>
+                <a:latin typeface="Arial" pitchFamily="34" charset="0"/>
+                <a:ea typeface="+mn-ea"/>
+                <a:cs typeface="Arial" pitchFamily="34" charset="0"/>
+              </a:defRPr>
+            </a:lvl1pPr>
+            <a:lvl2pPr marL="742950" indent="-285750" algn="l" defTabSz="914400" rtl="0" eaLnBrk="1" latinLnBrk="0" hangingPunct="1">
+              <a:spcBef>
+                <a:spcPct val="20000"/>
+              </a:spcBef>
+              <a:buFont typeface="Arial" pitchFamily="34" charset="0"/>
+              <a:buChar char="–"/>
+              <a:defRPr sz="2800" kern="1200">
+                <a:solidFill>
+                  <a:schemeClr val="tx1"/>
+                </a:solidFill>
+                <a:latin typeface="Arial" pitchFamily="34" charset="0"/>
+                <a:ea typeface="+mn-ea"/>
+                <a:cs typeface="Arial" pitchFamily="34" charset="0"/>
+              </a:defRPr>
+            </a:lvl2pPr>
+            <a:lvl3pPr marL="1143000" indent="-228600" algn="l" defTabSz="914400" rtl="0" eaLnBrk="1" latinLnBrk="0" hangingPunct="1">
+              <a:spcBef>
+                <a:spcPct val="20000"/>
+              </a:spcBef>
+              <a:buFont typeface="Arial" pitchFamily="34" charset="0"/>
+              <a:buChar char="•"/>
+              <a:defRPr sz="2400" kern="1200">
+                <a:solidFill>
+                  <a:schemeClr val="tx1"/>
+                </a:solidFill>
+                <a:latin typeface="Arial" pitchFamily="34" charset="0"/>
+                <a:ea typeface="+mn-ea"/>
+                <a:cs typeface="Arial" pitchFamily="34" charset="0"/>
+              </a:defRPr>
+            </a:lvl3pPr>
+            <a:lvl4pPr marL="1600200" indent="-228600" algn="l" defTabSz="914400" rtl="0" eaLnBrk="1" latinLnBrk="0" hangingPunct="1">
+              <a:spcBef>
+                <a:spcPct val="20000"/>
+              </a:spcBef>
+              <a:buFont typeface="Arial" pitchFamily="34" charset="0"/>
+              <a:buChar char="–"/>
+              <a:defRPr sz="2000" kern="1200">
+                <a:solidFill>
+                  <a:schemeClr val="tx1"/>
+                </a:solidFill>
+                <a:latin typeface="Arial" pitchFamily="34" charset="0"/>
+                <a:ea typeface="+mn-ea"/>
+                <a:cs typeface="Arial" pitchFamily="34" charset="0"/>
+              </a:defRPr>
+            </a:lvl4pPr>
+            <a:lvl5pPr marL="2057400" indent="-228600" algn="l" defTabSz="914400" rtl="0" eaLnBrk="1" latinLnBrk="0" hangingPunct="1">
+              <a:spcBef>
+                <a:spcPct val="20000"/>
+              </a:spcBef>
+              <a:buFont typeface="Arial" pitchFamily="34" charset="0"/>
+              <a:buChar char="»"/>
+              <a:defRPr sz="2000" kern="1200">
+                <a:solidFill>
+                  <a:schemeClr val="tx1"/>
+                </a:solidFill>
+                <a:latin typeface="Arial" pitchFamily="34" charset="0"/>
+                <a:ea typeface="+mn-ea"/>
+                <a:cs typeface="Arial" pitchFamily="34" charset="0"/>
+              </a:defRPr>
+            </a:lvl5pPr>
+            <a:lvl6pPr marL="2514600" indent="-228600" algn="l" defTabSz="914400" rtl="0" eaLnBrk="1" latinLnBrk="0" hangingPunct="1">
+              <a:spcBef>
+                <a:spcPct val="20000"/>
+              </a:spcBef>
+              <a:buFont typeface="Arial" pitchFamily="34" charset="0"/>
+              <a:buChar char="•"/>
+              <a:defRPr sz="2000" kern="1200">
+                <a:solidFill>
+                  <a:schemeClr val="tx1"/>
+                </a:solidFill>
+                <a:latin typeface="+mn-lt"/>
+                <a:ea typeface="+mn-ea"/>
+                <a:cs typeface="+mn-cs"/>
+              </a:defRPr>
+            </a:lvl6pPr>
+            <a:lvl7pPr marL="2971800" indent="-228600" algn="l" defTabSz="914400" rtl="0" eaLnBrk="1" latinLnBrk="0" hangingPunct="1">
+              <a:spcBef>
+                <a:spcPct val="20000"/>
+              </a:spcBef>
+              <a:buFont typeface="Arial" pitchFamily="34" charset="0"/>
+              <a:buChar char="•"/>
+              <a:defRPr sz="2000" kern="1200">
+                <a:solidFill>
+                  <a:schemeClr val="tx1"/>
+                </a:solidFill>
+                <a:latin typeface="+mn-lt"/>
+                <a:ea typeface="+mn-ea"/>
+                <a:cs typeface="+mn-cs"/>
+              </a:defRPr>
+            </a:lvl7pPr>
+            <a:lvl8pPr marL="3429000" indent="-228600" algn="l" defTabSz="914400" rtl="0" eaLnBrk="1" latinLnBrk="0" hangingPunct="1">
+              <a:spcBef>
+                <a:spcPct val="20000"/>
+              </a:spcBef>
+              <a:buFont typeface="Arial" pitchFamily="34" charset="0"/>
+              <a:buChar char="•"/>
+              <a:defRPr sz="2000" kern="1200">
+                <a:solidFill>
+                  <a:schemeClr val="tx1"/>
+                </a:solidFill>
+                <a:latin typeface="+mn-lt"/>
+                <a:ea typeface="+mn-ea"/>
+                <a:cs typeface="+mn-cs"/>
+              </a:defRPr>
+            </a:lvl8pPr>
+            <a:lvl9pPr marL="3886200" indent="-228600" algn="l" defTabSz="914400" rtl="0" eaLnBrk="1" latinLnBrk="0" hangingPunct="1">
+              <a:spcBef>
+                <a:spcPct val="20000"/>
+              </a:spcBef>
+              <a:buFont typeface="Arial" pitchFamily="34" charset="0"/>
+              <a:buChar char="•"/>
+              <a:defRPr sz="2000" kern="1200">
+                <a:solidFill>
+                  <a:schemeClr val="tx1"/>
+                </a:solidFill>
+                <a:latin typeface="+mn-lt"/>
+                <a:ea typeface="+mn-ea"/>
+                <a:cs typeface="+mn-cs"/>
+              </a:defRPr>
+            </a:lvl9pPr>
+          </a:lstStyle>
+          <a:p>
+            <a:r>
+              <a:rPr lang="en-GB" dirty="0"/>
+              <a:t>System already supports named staff members and class – staff relationships. </a:t>
+            </a:r>
+          </a:p>
+          <a:p>
+            <a:r>
+              <a:rPr lang="en-GB" dirty="0"/>
+              <a:t>We know the total number of lecture, tutorial and lab hours for a single student from the existing MDFs. By accounting for either class size or number of lab/tutorial groups, it would be easy to calculate the total number of staff hours required of a given module.</a:t>
+            </a:r>
+          </a:p>
+          <a:p>
+            <a:r>
+              <a:rPr lang="en-GB" dirty="0"/>
+              <a:t>This could also allow staff to see their total teaching commitment at any given time.</a:t>
+            </a:r>
+          </a:p>
+        </p:txBody>
+      </p:sp>
+    </p:spTree>
+    <p:extLst>
+      <p:ext uri="{BB962C8B-B14F-4D97-AF65-F5344CB8AC3E}">
+        <p14:creationId xmlns:p14="http://schemas.microsoft.com/office/powerpoint/2010/main" val="1298020837"/>
+      </p:ext>
+    </p:extLst>
+  </p:cSld>
+  <p:clrMapOvr>
+    <a:masterClrMapping/>
+  </p:clrMapOvr>
+</p:sld>
+</file>
+
+<file path=ppt/slides/slide8.xml><?xml version="1.0" encoding="utf-8"?>
 <p:sld xmlns:a="http://schemas.openxmlformats.org/drawingml/2006/main" xmlns:r="http://schemas.openxmlformats.org/officeDocument/2006/relationships" xmlns:p="http://schemas.openxmlformats.org/presentationml/2006/main">
   <p:cSld>
     <p:spTree>
@@ -3756,22 +5521,10 @@
   <p:clrMapOvr>
     <a:masterClrMapping/>
   </p:clrMapOvr>
-  <mc:AlternateContent xmlns:mc="http://schemas.openxmlformats.org/markup-compatibility/2006" xmlns:p14="http://schemas.microsoft.com/office/powerpoint/2010/main">
-    <mc:Choice Requires="p14">
-      <p:transition spd="slow" p14:dur="1600">
-        <p14:prism isInverted="1"/>
-      </p:transition>
-    </mc:Choice>
-    <mc:Fallback xmlns="">
-      <p:transition spd="slow">
-        <p:fade/>
-      </p:transition>
-    </mc:Fallback>
-  </mc:AlternateContent>
 </p:sld>
 </file>
 
-<file path=ppt/slides/slide5.xml><?xml version="1.0" encoding="utf-8"?>
+<file path=ppt/slides/slide9.xml><?xml version="1.0" encoding="utf-8"?>
 <p:sld xmlns:a="http://schemas.openxmlformats.org/drawingml/2006/main" xmlns:r="http://schemas.openxmlformats.org/officeDocument/2006/relationships" xmlns:p="http://schemas.openxmlformats.org/presentationml/2006/main">
   <p:cSld>
     <p:spTree>
@@ -3874,41 +5627,6 @@
       </p:sp>
       <p:pic>
         <p:nvPicPr>
-          <p:cNvPr id="8" name="Picture 7">
-            <a:extLst>
-              <a:ext uri="{FF2B5EF4-FFF2-40B4-BE49-F238E27FC236}">
-                <a16:creationId xmlns:a16="http://schemas.microsoft.com/office/drawing/2014/main" id="{240E8D31-1047-4B83-9C06-302DDBD3B90B}"/>
-              </a:ext>
-            </a:extLst>
-          </p:cNvPr>
-          <p:cNvPicPr>
-            <a:picLocks noChangeAspect="1"/>
-          </p:cNvPicPr>
-          <p:nvPr/>
-        </p:nvPicPr>
-        <p:blipFill rotWithShape="1">
-          <a:blip r:embed="rId2">
-            <a:extLst>
-              <a:ext uri="{28A0092B-C50C-407E-A947-70E740481C1C}">
-                <a14:useLocalDpi xmlns:a14="http://schemas.microsoft.com/office/drawing/2010/main" val="0"/>
-              </a:ext>
-            </a:extLst>
-          </a:blip>
-          <a:srcRect l="1957"/>
-          <a:stretch/>
-        </p:blipFill>
-        <p:spPr>
-          <a:xfrm>
-            <a:off x="0" y="2204864"/>
-            <a:ext cx="4572000" cy="4680520"/>
-          </a:xfrm>
-          <a:prstGeom prst="rect">
-            <a:avLst/>
-          </a:prstGeom>
-        </p:spPr>
-      </p:pic>
-      <p:pic>
-        <p:nvPicPr>
           <p:cNvPr id="2" name="Picture 1">
             <a:extLst>
               <a:ext uri="{FF2B5EF4-FFF2-40B4-BE49-F238E27FC236}">
@@ -3922,13 +5640,13 @@
           <p:nvPr/>
         </p:nvPicPr>
         <p:blipFill rotWithShape="1">
-          <a:blip r:embed="rId3"/>
+          <a:blip r:embed="rId2"/>
           <a:srcRect l="61813" t="28846" r="13042" b="5665"/>
           <a:stretch/>
         </p:blipFill>
         <p:spPr>
           <a:xfrm>
-            <a:off x="4545093" y="2204864"/>
+            <a:off x="4545093" y="2204865"/>
             <a:ext cx="4598907" cy="4680520"/>
           </a:xfrm>
           <a:prstGeom prst="rect">
@@ -3977,80 +5695,631 @@
           </a:p>
         </p:txBody>
       </p:sp>
+      <p:pic>
+        <p:nvPicPr>
+          <p:cNvPr id="7" name="Content Placeholder 4">
+            <a:extLst>
+              <a:ext uri="{FF2B5EF4-FFF2-40B4-BE49-F238E27FC236}">
+                <a16:creationId xmlns:a16="http://schemas.microsoft.com/office/drawing/2014/main" id="{7BCBD38B-FCD0-4793-B019-C4BF6678CF9A}"/>
+              </a:ext>
+            </a:extLst>
+          </p:cNvPr>
+          <p:cNvPicPr>
+            <a:picLocks noChangeAspect="1"/>
+          </p:cNvPicPr>
+          <p:nvPr/>
+        </p:nvPicPr>
+        <p:blipFill rotWithShape="1">
+          <a:blip r:embed="rId3">
+            <a:extLst>
+              <a:ext uri="{28A0092B-C50C-407E-A947-70E740481C1C}">
+                <a14:useLocalDpi xmlns:a14="http://schemas.microsoft.com/office/drawing/2010/main" val="0"/>
+              </a:ext>
+            </a:extLst>
+          </a:blip>
+          <a:srcRect r="-2208"/>
+          <a:stretch/>
+        </p:blipFill>
+        <p:spPr>
+          <a:xfrm>
+            <a:off x="-20303" y="3401755"/>
+            <a:ext cx="4592303" cy="3456246"/>
+          </a:xfrm>
+          <a:prstGeom prst="rect">
+            <a:avLst/>
+          </a:prstGeom>
+        </p:spPr>
+      </p:pic>
+      <p:sp>
+        <p:nvSpPr>
+          <p:cNvPr id="5" name="Oval 4">
+            <a:extLst>
+              <a:ext uri="{FF2B5EF4-FFF2-40B4-BE49-F238E27FC236}">
+                <a16:creationId xmlns:a16="http://schemas.microsoft.com/office/drawing/2014/main" id="{127057E6-9CB4-427F-84A5-6CA247FE3979}"/>
+              </a:ext>
+            </a:extLst>
+          </p:cNvPr>
+          <p:cNvSpPr/>
+          <p:nvPr/>
+        </p:nvSpPr>
+        <p:spPr>
+          <a:xfrm>
+            <a:off x="1115616" y="3429000"/>
+            <a:ext cx="1152128" cy="2736304"/>
+          </a:xfrm>
+          <a:prstGeom prst="ellipse">
+            <a:avLst/>
+          </a:prstGeom>
+          <a:noFill/>
+        </p:spPr>
+        <p:style>
+          <a:lnRef idx="2">
+            <a:schemeClr val="accent1"/>
+          </a:lnRef>
+          <a:fillRef idx="1">
+            <a:schemeClr val="lt1"/>
+          </a:fillRef>
+          <a:effectRef idx="0">
+            <a:schemeClr val="accent1"/>
+          </a:effectRef>
+          <a:fontRef idx="minor">
+            <a:schemeClr val="dk1"/>
+          </a:fontRef>
+        </p:style>
+        <p:txBody>
+          <a:bodyPr rtlCol="0" anchor="ctr"/>
+          <a:lstStyle/>
+          <a:p>
+            <a:pPr algn="ctr"/>
+            <a:endParaRPr lang="en-GB"/>
+          </a:p>
+        </p:txBody>
+      </p:sp>
+      <p:sp>
+        <p:nvSpPr>
+          <p:cNvPr id="11" name="Rectangle 10">
+            <a:extLst>
+              <a:ext uri="{FF2B5EF4-FFF2-40B4-BE49-F238E27FC236}">
+                <a16:creationId xmlns:a16="http://schemas.microsoft.com/office/drawing/2014/main" id="{FAD06F58-F852-44C0-B1EA-5A4E1327BC0E}"/>
+              </a:ext>
+            </a:extLst>
+          </p:cNvPr>
+          <p:cNvSpPr/>
+          <p:nvPr/>
+        </p:nvSpPr>
+        <p:spPr>
+          <a:xfrm>
+            <a:off x="5148064" y="3140968"/>
+            <a:ext cx="1368152" cy="144016"/>
+          </a:xfrm>
+          <a:prstGeom prst="rect">
+            <a:avLst/>
+          </a:prstGeom>
+          <a:noFill/>
+        </p:spPr>
+        <p:style>
+          <a:lnRef idx="2">
+            <a:schemeClr val="accent1">
+              <a:shade val="50000"/>
+            </a:schemeClr>
+          </a:lnRef>
+          <a:fillRef idx="1">
+            <a:schemeClr val="accent1"/>
+          </a:fillRef>
+          <a:effectRef idx="0">
+            <a:schemeClr val="accent1"/>
+          </a:effectRef>
+          <a:fontRef idx="minor">
+            <a:schemeClr val="lt1"/>
+          </a:fontRef>
+        </p:style>
+        <p:txBody>
+          <a:bodyPr rtlCol="0" anchor="ctr"/>
+          <a:lstStyle/>
+          <a:p>
+            <a:pPr algn="ctr"/>
+            <a:endParaRPr lang="en-GB"/>
+          </a:p>
+        </p:txBody>
+      </p:sp>
+      <p:sp>
+        <p:nvSpPr>
+          <p:cNvPr id="12" name="Rectangle 11">
+            <a:extLst>
+              <a:ext uri="{FF2B5EF4-FFF2-40B4-BE49-F238E27FC236}">
+                <a16:creationId xmlns:a16="http://schemas.microsoft.com/office/drawing/2014/main" id="{E0399A52-15C1-4750-B4EC-B36D5ADBDD1E}"/>
+              </a:ext>
+            </a:extLst>
+          </p:cNvPr>
+          <p:cNvSpPr/>
+          <p:nvPr/>
+        </p:nvSpPr>
+        <p:spPr>
+          <a:xfrm>
+            <a:off x="5174882" y="3403211"/>
+            <a:ext cx="837278" cy="144016"/>
+          </a:xfrm>
+          <a:prstGeom prst="rect">
+            <a:avLst/>
+          </a:prstGeom>
+          <a:noFill/>
+        </p:spPr>
+        <p:style>
+          <a:lnRef idx="2">
+            <a:schemeClr val="accent1">
+              <a:shade val="50000"/>
+            </a:schemeClr>
+          </a:lnRef>
+          <a:fillRef idx="1">
+            <a:schemeClr val="accent1"/>
+          </a:fillRef>
+          <a:effectRef idx="0">
+            <a:schemeClr val="accent1"/>
+          </a:effectRef>
+          <a:fontRef idx="minor">
+            <a:schemeClr val="lt1"/>
+          </a:fontRef>
+        </p:style>
+        <p:txBody>
+          <a:bodyPr rtlCol="0" anchor="ctr"/>
+          <a:lstStyle/>
+          <a:p>
+            <a:pPr algn="ctr"/>
+            <a:endParaRPr lang="en-GB"/>
+          </a:p>
+        </p:txBody>
+      </p:sp>
+      <p:sp>
+        <p:nvSpPr>
+          <p:cNvPr id="13" name="Rectangle 12">
+            <a:extLst>
+              <a:ext uri="{FF2B5EF4-FFF2-40B4-BE49-F238E27FC236}">
+                <a16:creationId xmlns:a16="http://schemas.microsoft.com/office/drawing/2014/main" id="{F38A53BA-9147-43B9-8558-84E1CB5B9369}"/>
+              </a:ext>
+            </a:extLst>
+          </p:cNvPr>
+          <p:cNvSpPr/>
+          <p:nvPr/>
+        </p:nvSpPr>
+        <p:spPr>
+          <a:xfrm>
+            <a:off x="7524328" y="3356992"/>
+            <a:ext cx="1152128" cy="792088"/>
+          </a:xfrm>
+          <a:prstGeom prst="rect">
+            <a:avLst/>
+          </a:prstGeom>
+          <a:noFill/>
+        </p:spPr>
+        <p:style>
+          <a:lnRef idx="2">
+            <a:schemeClr val="accent1">
+              <a:shade val="50000"/>
+            </a:schemeClr>
+          </a:lnRef>
+          <a:fillRef idx="1">
+            <a:schemeClr val="accent1"/>
+          </a:fillRef>
+          <a:effectRef idx="0">
+            <a:schemeClr val="accent1"/>
+          </a:effectRef>
+          <a:fontRef idx="minor">
+            <a:schemeClr val="lt1"/>
+          </a:fontRef>
+        </p:style>
+        <p:txBody>
+          <a:bodyPr rtlCol="0" anchor="ctr"/>
+          <a:lstStyle/>
+          <a:p>
+            <a:pPr algn="ctr"/>
+            <a:endParaRPr lang="en-GB"/>
+          </a:p>
+        </p:txBody>
+      </p:sp>
+      <p:sp>
+        <p:nvSpPr>
+          <p:cNvPr id="14" name="Rectangle 13">
+            <a:extLst>
+              <a:ext uri="{FF2B5EF4-FFF2-40B4-BE49-F238E27FC236}">
+                <a16:creationId xmlns:a16="http://schemas.microsoft.com/office/drawing/2014/main" id="{A8A37BAC-CB70-4342-8092-ADEFB1C0E95E}"/>
+              </a:ext>
+            </a:extLst>
+          </p:cNvPr>
+          <p:cNvSpPr/>
+          <p:nvPr/>
+        </p:nvSpPr>
+        <p:spPr>
+          <a:xfrm>
+            <a:off x="5164595" y="3933056"/>
+            <a:ext cx="1476000" cy="108000"/>
+          </a:xfrm>
+          <a:prstGeom prst="rect">
+            <a:avLst/>
+          </a:prstGeom>
+          <a:noFill/>
+        </p:spPr>
+        <p:style>
+          <a:lnRef idx="2">
+            <a:schemeClr val="accent1">
+              <a:shade val="50000"/>
+            </a:schemeClr>
+          </a:lnRef>
+          <a:fillRef idx="1">
+            <a:schemeClr val="accent1"/>
+          </a:fillRef>
+          <a:effectRef idx="0">
+            <a:schemeClr val="accent1"/>
+          </a:effectRef>
+          <a:fontRef idx="minor">
+            <a:schemeClr val="lt1"/>
+          </a:fontRef>
+        </p:style>
+        <p:txBody>
+          <a:bodyPr rtlCol="0" anchor="ctr"/>
+          <a:lstStyle/>
+          <a:p>
+            <a:pPr algn="ctr"/>
+            <a:endParaRPr lang="en-GB"/>
+          </a:p>
+        </p:txBody>
+      </p:sp>
+      <p:sp>
+        <p:nvSpPr>
+          <p:cNvPr id="15" name="Oval 14">
+            <a:extLst>
+              <a:ext uri="{FF2B5EF4-FFF2-40B4-BE49-F238E27FC236}">
+                <a16:creationId xmlns:a16="http://schemas.microsoft.com/office/drawing/2014/main" id="{85113E28-DEA5-4767-A5FF-7F41DE741FA5}"/>
+              </a:ext>
+            </a:extLst>
+          </p:cNvPr>
+          <p:cNvSpPr/>
+          <p:nvPr/>
+        </p:nvSpPr>
+        <p:spPr>
+          <a:xfrm>
+            <a:off x="-20303" y="3500421"/>
+            <a:ext cx="1152128" cy="1080120"/>
+          </a:xfrm>
+          <a:prstGeom prst="ellipse">
+            <a:avLst/>
+          </a:prstGeom>
+          <a:noFill/>
+          <a:ln>
+            <a:solidFill>
+              <a:schemeClr val="accent2"/>
+            </a:solidFill>
+          </a:ln>
+        </p:spPr>
+        <p:style>
+          <a:lnRef idx="2">
+            <a:schemeClr val="accent1"/>
+          </a:lnRef>
+          <a:fillRef idx="1">
+            <a:schemeClr val="lt1"/>
+          </a:fillRef>
+          <a:effectRef idx="0">
+            <a:schemeClr val="accent1"/>
+          </a:effectRef>
+          <a:fontRef idx="minor">
+            <a:schemeClr val="dk1"/>
+          </a:fontRef>
+        </p:style>
+        <p:txBody>
+          <a:bodyPr rtlCol="0" anchor="ctr"/>
+          <a:lstStyle/>
+          <a:p>
+            <a:pPr algn="ctr"/>
+            <a:endParaRPr lang="en-GB"/>
+          </a:p>
+        </p:txBody>
+      </p:sp>
+      <p:sp>
+        <p:nvSpPr>
+          <p:cNvPr id="16" name="Rectangle 15">
+            <a:extLst>
+              <a:ext uri="{FF2B5EF4-FFF2-40B4-BE49-F238E27FC236}">
+                <a16:creationId xmlns:a16="http://schemas.microsoft.com/office/drawing/2014/main" id="{686C52FD-9C7B-4ADA-AF07-597F4CE75630}"/>
+              </a:ext>
+            </a:extLst>
+          </p:cNvPr>
+          <p:cNvSpPr/>
+          <p:nvPr/>
+        </p:nvSpPr>
+        <p:spPr>
+          <a:xfrm>
+            <a:off x="5164596" y="3589322"/>
+            <a:ext cx="2287724" cy="343733"/>
+          </a:xfrm>
+          <a:prstGeom prst="rect">
+            <a:avLst/>
+          </a:prstGeom>
+          <a:noFill/>
+          <a:ln>
+            <a:solidFill>
+              <a:schemeClr val="accent2"/>
+            </a:solidFill>
+          </a:ln>
+        </p:spPr>
+        <p:style>
+          <a:lnRef idx="2">
+            <a:schemeClr val="accent1">
+              <a:shade val="50000"/>
+            </a:schemeClr>
+          </a:lnRef>
+          <a:fillRef idx="1">
+            <a:schemeClr val="accent1"/>
+          </a:fillRef>
+          <a:effectRef idx="0">
+            <a:schemeClr val="accent1"/>
+          </a:effectRef>
+          <a:fontRef idx="minor">
+            <a:schemeClr val="lt1"/>
+          </a:fontRef>
+        </p:style>
+        <p:txBody>
+          <a:bodyPr rtlCol="0" anchor="ctr"/>
+          <a:lstStyle/>
+          <a:p>
+            <a:pPr algn="ctr"/>
+            <a:endParaRPr lang="en-GB"/>
+          </a:p>
+        </p:txBody>
+      </p:sp>
+      <p:sp>
+        <p:nvSpPr>
+          <p:cNvPr id="17" name="Oval 16">
+            <a:extLst>
+              <a:ext uri="{FF2B5EF4-FFF2-40B4-BE49-F238E27FC236}">
+                <a16:creationId xmlns:a16="http://schemas.microsoft.com/office/drawing/2014/main" id="{AD2C4356-317F-41BA-9B5A-4370A3C9A4B9}"/>
+              </a:ext>
+            </a:extLst>
+          </p:cNvPr>
+          <p:cNvSpPr/>
+          <p:nvPr/>
+        </p:nvSpPr>
+        <p:spPr>
+          <a:xfrm>
+            <a:off x="2411760" y="4509120"/>
+            <a:ext cx="991903" cy="720080"/>
+          </a:xfrm>
+          <a:prstGeom prst="ellipse">
+            <a:avLst/>
+          </a:prstGeom>
+          <a:noFill/>
+          <a:ln>
+            <a:solidFill>
+              <a:schemeClr val="accent3"/>
+            </a:solidFill>
+          </a:ln>
+        </p:spPr>
+        <p:style>
+          <a:lnRef idx="2">
+            <a:schemeClr val="accent1">
+              <a:shade val="50000"/>
+            </a:schemeClr>
+          </a:lnRef>
+          <a:fillRef idx="1">
+            <a:schemeClr val="accent1"/>
+          </a:fillRef>
+          <a:effectRef idx="0">
+            <a:schemeClr val="accent1"/>
+          </a:effectRef>
+          <a:fontRef idx="minor">
+            <a:schemeClr val="lt1"/>
+          </a:fontRef>
+        </p:style>
+        <p:txBody>
+          <a:bodyPr rtlCol="0" anchor="ctr"/>
+          <a:lstStyle/>
+          <a:p>
+            <a:pPr algn="ctr"/>
+            <a:endParaRPr lang="en-GB"/>
+          </a:p>
+        </p:txBody>
+      </p:sp>
+      <p:sp>
+        <p:nvSpPr>
+          <p:cNvPr id="18" name="Rectangle 17">
+            <a:extLst>
+              <a:ext uri="{FF2B5EF4-FFF2-40B4-BE49-F238E27FC236}">
+                <a16:creationId xmlns:a16="http://schemas.microsoft.com/office/drawing/2014/main" id="{82BFAD6A-0075-4D4B-B97F-7EFD77978937}"/>
+              </a:ext>
+            </a:extLst>
+          </p:cNvPr>
+          <p:cNvSpPr/>
+          <p:nvPr/>
+        </p:nvSpPr>
+        <p:spPr>
+          <a:xfrm>
+            <a:off x="5160044" y="4051283"/>
+            <a:ext cx="1212156" cy="144016"/>
+          </a:xfrm>
+          <a:prstGeom prst="rect">
+            <a:avLst/>
+          </a:prstGeom>
+          <a:noFill/>
+          <a:ln>
+            <a:solidFill>
+              <a:schemeClr val="accent3"/>
+            </a:solidFill>
+          </a:ln>
+        </p:spPr>
+        <p:style>
+          <a:lnRef idx="2">
+            <a:schemeClr val="accent1">
+              <a:shade val="50000"/>
+            </a:schemeClr>
+          </a:lnRef>
+          <a:fillRef idx="1">
+            <a:schemeClr val="accent1"/>
+          </a:fillRef>
+          <a:effectRef idx="0">
+            <a:schemeClr val="accent1"/>
+          </a:effectRef>
+          <a:fontRef idx="minor">
+            <a:schemeClr val="lt1"/>
+          </a:fontRef>
+        </p:style>
+        <p:txBody>
+          <a:bodyPr rtlCol="0" anchor="ctr"/>
+          <a:lstStyle/>
+          <a:p>
+            <a:pPr algn="ctr"/>
+            <a:endParaRPr lang="en-GB"/>
+          </a:p>
+        </p:txBody>
+      </p:sp>
+      <p:sp>
+        <p:nvSpPr>
+          <p:cNvPr id="19" name="Rectangle 18">
+            <a:extLst>
+              <a:ext uri="{FF2B5EF4-FFF2-40B4-BE49-F238E27FC236}">
+                <a16:creationId xmlns:a16="http://schemas.microsoft.com/office/drawing/2014/main" id="{9B3DDF55-D986-45A4-809C-2EC8B4FC4A62}"/>
+              </a:ext>
+            </a:extLst>
+          </p:cNvPr>
+          <p:cNvSpPr/>
+          <p:nvPr/>
+        </p:nvSpPr>
+        <p:spPr>
+          <a:xfrm>
+            <a:off x="5155282" y="4473116"/>
+            <a:ext cx="2287724" cy="252027"/>
+          </a:xfrm>
+          <a:prstGeom prst="rect">
+            <a:avLst/>
+          </a:prstGeom>
+          <a:noFill/>
+        </p:spPr>
+        <p:style>
+          <a:lnRef idx="2">
+            <a:schemeClr val="accent1">
+              <a:shade val="50000"/>
+            </a:schemeClr>
+          </a:lnRef>
+          <a:fillRef idx="1">
+            <a:schemeClr val="accent1"/>
+          </a:fillRef>
+          <a:effectRef idx="0">
+            <a:schemeClr val="accent1"/>
+          </a:effectRef>
+          <a:fontRef idx="minor">
+            <a:schemeClr val="lt1"/>
+          </a:fontRef>
+        </p:style>
+        <p:txBody>
+          <a:bodyPr rtlCol="0" anchor="ctr"/>
+          <a:lstStyle/>
+          <a:p>
+            <a:pPr algn="ctr"/>
+            <a:endParaRPr lang="en-GB"/>
+          </a:p>
+        </p:txBody>
+      </p:sp>
+      <p:sp>
+        <p:nvSpPr>
+          <p:cNvPr id="20" name="Rectangle 19">
+            <a:extLst>
+              <a:ext uri="{FF2B5EF4-FFF2-40B4-BE49-F238E27FC236}">
+                <a16:creationId xmlns:a16="http://schemas.microsoft.com/office/drawing/2014/main" id="{E7A32DED-ECE1-4AD2-8F3E-AB3BBAE18ED3}"/>
+              </a:ext>
+            </a:extLst>
+          </p:cNvPr>
+          <p:cNvSpPr/>
+          <p:nvPr/>
+        </p:nvSpPr>
+        <p:spPr>
+          <a:xfrm>
+            <a:off x="5164594" y="5205880"/>
+            <a:ext cx="3511861" cy="383359"/>
+          </a:xfrm>
+          <a:prstGeom prst="rect">
+            <a:avLst/>
+          </a:prstGeom>
+          <a:noFill/>
+        </p:spPr>
+        <p:style>
+          <a:lnRef idx="2">
+            <a:schemeClr val="accent1">
+              <a:shade val="50000"/>
+            </a:schemeClr>
+          </a:lnRef>
+          <a:fillRef idx="1">
+            <a:schemeClr val="accent1"/>
+          </a:fillRef>
+          <a:effectRef idx="0">
+            <a:schemeClr val="accent1"/>
+          </a:effectRef>
+          <a:fontRef idx="minor">
+            <a:schemeClr val="lt1"/>
+          </a:fontRef>
+        </p:style>
+        <p:txBody>
+          <a:bodyPr rtlCol="0" anchor="ctr"/>
+          <a:lstStyle/>
+          <a:p>
+            <a:pPr algn="ctr"/>
+            <a:endParaRPr lang="en-GB"/>
+          </a:p>
+        </p:txBody>
+      </p:sp>
+      <p:sp>
+        <p:nvSpPr>
+          <p:cNvPr id="21" name="Rectangle 20">
+            <a:extLst>
+              <a:ext uri="{FF2B5EF4-FFF2-40B4-BE49-F238E27FC236}">
+                <a16:creationId xmlns:a16="http://schemas.microsoft.com/office/drawing/2014/main" id="{1B41EDBC-EDE7-4FC9-9EE7-54A9D9126280}"/>
+              </a:ext>
+            </a:extLst>
+          </p:cNvPr>
+          <p:cNvSpPr/>
+          <p:nvPr/>
+        </p:nvSpPr>
+        <p:spPr>
+          <a:xfrm>
+            <a:off x="5174882" y="6043886"/>
+            <a:ext cx="3501573" cy="697482"/>
+          </a:xfrm>
+          <a:prstGeom prst="rect">
+            <a:avLst/>
+          </a:prstGeom>
+          <a:noFill/>
+        </p:spPr>
+        <p:style>
+          <a:lnRef idx="2">
+            <a:schemeClr val="accent1">
+              <a:shade val="50000"/>
+            </a:schemeClr>
+          </a:lnRef>
+          <a:fillRef idx="1">
+            <a:schemeClr val="accent1"/>
+          </a:fillRef>
+          <a:effectRef idx="0">
+            <a:schemeClr val="accent1"/>
+          </a:effectRef>
+          <a:fontRef idx="minor">
+            <a:schemeClr val="lt1"/>
+          </a:fontRef>
+        </p:style>
+        <p:txBody>
+          <a:bodyPr rtlCol="0" anchor="ctr"/>
+          <a:lstStyle/>
+          <a:p>
+            <a:pPr algn="ctr"/>
+            <a:endParaRPr lang="en-GB"/>
+          </a:p>
+        </p:txBody>
+      </p:sp>
     </p:spTree>
     <p:extLst>
       <p:ext uri="{BB962C8B-B14F-4D97-AF65-F5344CB8AC3E}">
-        <p14:creationId xmlns:p14="http://schemas.microsoft.com/office/powerpoint/2010/main" val="2323499326"/>
+        <p14:creationId xmlns:p14="http://schemas.microsoft.com/office/powerpoint/2010/main" val="1302797560"/>
       </p:ext>
     </p:extLst>
   </p:cSld>
   <p:clrMapOvr>
     <a:masterClrMapping/>
   </p:clrMapOvr>
-  <mc:AlternateContent xmlns:mc="http://schemas.openxmlformats.org/markup-compatibility/2006" xmlns:p14="http://schemas.microsoft.com/office/powerpoint/2010/main">
-    <mc:Choice Requires="p14">
-      <p:transition spd="slow" p14:dur="1600">
-        <p14:prism isInverted="1"/>
-      </p:transition>
-    </mc:Choice>
-    <mc:Fallback xmlns="">
-      <p:transition spd="slow">
-        <p:fade/>
-      </p:transition>
-    </mc:Fallback>
-  </mc:AlternateContent>
-</p:sld>
-</file>
-
-<file path=ppt/slides/slide6.xml><?xml version="1.0" encoding="utf-8"?>
-<p:sld xmlns:a="http://schemas.openxmlformats.org/drawingml/2006/main" xmlns:r="http://schemas.openxmlformats.org/officeDocument/2006/relationships" xmlns:p="http://schemas.openxmlformats.org/presentationml/2006/main">
-  <p:cSld>
-    <p:bg>
-      <p:bgPr>
-        <a:blipFill dpi="0" rotWithShape="1">
-          <a:blip r:embed="rId2">
-            <a:lum/>
-          </a:blip>
-          <a:srcRect/>
-          <a:stretch>
-            <a:fillRect/>
-          </a:stretch>
-        </a:blipFill>
-        <a:effectLst/>
-      </p:bgPr>
-    </p:bg>
-    <p:spTree>
-      <p:nvGrpSpPr>
-        <p:cNvPr id="1" name=""/>
-        <p:cNvGrpSpPr/>
-        <p:nvPr/>
-      </p:nvGrpSpPr>
-      <p:grpSpPr>
-        <a:xfrm>
-          <a:off x="0" y="0"/>
-          <a:ext cx="0" cy="0"/>
-          <a:chOff x="0" y="0"/>
-          <a:chExt cx="0" cy="0"/>
-        </a:xfrm>
-      </p:grpSpPr>
-    </p:spTree>
-    <p:extLst>
-      <p:ext uri="{BB962C8B-B14F-4D97-AF65-F5344CB8AC3E}">
-        <p14:creationId xmlns:p14="http://schemas.microsoft.com/office/powerpoint/2010/main" val="2857295147"/>
-      </p:ext>
-    </p:extLst>
-  </p:cSld>
-  <p:clrMapOvr>
-    <a:masterClrMapping/>
-  </p:clrMapOvr>
-  <mc:AlternateContent xmlns:mc="http://schemas.openxmlformats.org/markup-compatibility/2006" xmlns:p14="http://schemas.microsoft.com/office/powerpoint/2010/main">
-    <mc:Choice Requires="p14">
-      <p:transition p14:dur="0"/>
-    </mc:Choice>
-    <mc:Fallback xmlns="">
-      <p:transition/>
-    </mc:Fallback>
-  </mc:AlternateContent>
 </p:sld>
 </file>
 

</xml_diff>